<commit_message>
1+ back slide; banner at Q/A; animation adjust
</commit_message>
<xml_diff>
--- a/report/presentation.pptx
+++ b/report/presentation.pptx
@@ -5,7 +5,7 @@
     <p:sldMasterId id="2147483780" r:id="rId1"/>
   </p:sldMasterIdLst>
   <p:notesMasterIdLst>
-    <p:notesMasterId r:id="rId28"/>
+    <p:notesMasterId r:id="rId29"/>
   </p:notesMasterIdLst>
   <p:sldIdLst>
     <p:sldId id="256" r:id="rId2"/>
@@ -31,9 +31,10 @@
     <p:sldId id="273" r:id="rId22"/>
     <p:sldId id="274" r:id="rId23"/>
     <p:sldId id="262" r:id="rId24"/>
-    <p:sldId id="277" r:id="rId25"/>
-    <p:sldId id="278" r:id="rId26"/>
-    <p:sldId id="279" r:id="rId27"/>
+    <p:sldId id="282" r:id="rId25"/>
+    <p:sldId id="277" r:id="rId26"/>
+    <p:sldId id="278" r:id="rId27"/>
+    <p:sldId id="279" r:id="rId28"/>
   </p:sldIdLst>
   <p:sldSz cx="9144000" cy="6858000" type="screen4x3"/>
   <p:notesSz cx="6858000" cy="9144000"/>
@@ -6448,12 +6449,9 @@
             <a:endParaRPr lang="en-US" dirty="0" smtClean="0"/>
           </a:p>
           <a:p>
-            <a:r>
-              <a:rPr lang="en-US" dirty="0" smtClean="0"/>
-              <a:t>Rank Preserving Regression (RPR) </a:t>
-            </a:r>
-          </a:p>
-          <a:p>
+            <a:pPr>
+              <a:buNone/>
+            </a:pPr>
             <a:endParaRPr lang="en-US" dirty="0" smtClean="0"/>
           </a:p>
           <a:p>
@@ -6501,6 +6499,81 @@
           </a:graphicData>
         </a:graphic>
       </p:graphicFrame>
+      <p:sp>
+        <p:nvSpPr>
+          <p:cNvPr id="7" name="Rectangular Callout 6"/>
+          <p:cNvSpPr/>
+          <p:nvPr/>
+        </p:nvSpPr>
+        <p:spPr>
+          <a:xfrm>
+            <a:off x="3429000" y="5638800"/>
+            <a:ext cx="4267200" cy="533400"/>
+          </a:xfrm>
+          <a:prstGeom prst="wedgeRectCallout">
+            <a:avLst>
+              <a:gd name="adj1" fmla="val -39195"/>
+              <a:gd name="adj2" fmla="val -115897"/>
+            </a:avLst>
+          </a:prstGeom>
+        </p:spPr>
+        <p:style>
+          <a:lnRef idx="2">
+            <a:schemeClr val="accent1">
+              <a:shade val="50000"/>
+            </a:schemeClr>
+          </a:lnRef>
+          <a:fillRef idx="1">
+            <a:schemeClr val="accent1"/>
+          </a:fillRef>
+          <a:effectRef idx="0">
+            <a:schemeClr val="accent1"/>
+          </a:effectRef>
+          <a:fontRef idx="minor">
+            <a:schemeClr val="lt1"/>
+          </a:fontRef>
+        </p:style>
+        <p:txBody>
+          <a:bodyPr rtlCol="0" anchor="ctr"/>
+          <a:lstStyle/>
+          <a:p>
+            <a:r>
+              <a:rPr lang="en-US" dirty="0" smtClean="0"/>
+              <a:t>Rank Preserving Regression (RPR) </a:t>
+            </a:r>
+          </a:p>
+        </p:txBody>
+      </p:sp>
+      <p:sp>
+        <p:nvSpPr>
+          <p:cNvPr id="8" name="TextBox 7"/>
+          <p:cNvSpPr txBox="1"/>
+          <p:nvPr/>
+        </p:nvSpPr>
+        <p:spPr>
+          <a:xfrm>
+            <a:off x="381000" y="6550223"/>
+            <a:ext cx="8534400" cy="307777"/>
+          </a:xfrm>
+          <a:prstGeom prst="rect">
+            <a:avLst/>
+          </a:prstGeom>
+          <a:noFill/>
+        </p:spPr>
+        <p:txBody>
+          <a:bodyPr wrap="square" rtlCol="0">
+            <a:spAutoFit/>
+          </a:bodyPr>
+          <a:lstStyle/>
+          <a:p>
+            <a:r>
+              <a:rPr lang="en-US" sz="1400" dirty="0" smtClean="0"/>
+              <a:t>RPR is my temporary term. If you know somebody has already done this, please kindly inform me. </a:t>
+            </a:r>
+            <a:endParaRPr lang="en-US" sz="1400" dirty="0"/>
+          </a:p>
+        </p:txBody>
+      </p:sp>
     </p:spTree>
   </p:cSld>
   <p:clrMapOvr>
@@ -6768,11 +6841,7 @@
                                           </p:stCondLst>
                                         </p:cTn>
                                         <p:tgtEl>
-                                          <p:spTgt spid="3">
-                                            <p:txEl>
-                                              <p:pRg st="7" end="7"/>
-                                            </p:txEl>
-                                          </p:spTgt>
+                                          <p:spTgt spid="7"/>
                                         </p:tgtEl>
                                         <p:attrNameLst>
                                           <p:attrName>style.visibility</p:attrName>
@@ -6786,11 +6855,42 @@
                                       <p:cBhvr>
                                         <p:cTn id="27" dur="500"/>
                                         <p:tgtEl>
-                                          <p:spTgt spid="3">
-                                            <p:txEl>
-                                              <p:pRg st="7" end="7"/>
-                                            </p:txEl>
-                                          </p:spTgt>
+                                          <p:spTgt spid="7"/>
+                                        </p:tgtEl>
+                                      </p:cBhvr>
+                                    </p:animEffect>
+                                  </p:childTnLst>
+                                </p:cTn>
+                              </p:par>
+                              <p:par>
+                                <p:cTn id="28" presetID="22" presetClass="entr" presetSubtype="4" fill="hold" grpId="0" nodeType="withEffect">
+                                  <p:stCondLst>
+                                    <p:cond delay="0"/>
+                                  </p:stCondLst>
+                                  <p:childTnLst>
+                                    <p:set>
+                                      <p:cBhvr>
+                                        <p:cTn id="29" dur="1" fill="hold">
+                                          <p:stCondLst>
+                                            <p:cond delay="0"/>
+                                          </p:stCondLst>
+                                        </p:cTn>
+                                        <p:tgtEl>
+                                          <p:spTgt spid="8"/>
+                                        </p:tgtEl>
+                                        <p:attrNameLst>
+                                          <p:attrName>style.visibility</p:attrName>
+                                        </p:attrNameLst>
+                                      </p:cBhvr>
+                                      <p:to>
+                                        <p:strVal val="visible"/>
+                                      </p:to>
+                                    </p:set>
+                                    <p:animEffect transition="in" filter="wipe(down)">
+                                      <p:cBhvr>
+                                        <p:cTn id="30" dur="500"/>
+                                        <p:tgtEl>
+                                          <p:spTgt spid="8"/>
                                         </p:tgtEl>
                                       </p:cBhvr>
                                     </p:animEffect>
@@ -6826,6 +6926,8 @@
     </p:tnLst>
     <p:bldLst>
       <p:bldP spid="3" grpId="0" uiExpand="1" build="p"/>
+      <p:bldP spid="7" grpId="0" animBg="1"/>
+      <p:bldP spid="8" grpId="0"/>
     </p:bldLst>
   </p:timing>
 </p:sld>
@@ -6867,7 +6969,7 @@
           <a:p>
             <a:r>
               <a:rPr lang="en-US" dirty="0" smtClean="0"/>
-              <a:t>Re-formulation</a:t>
+              <a:t>Transformation</a:t>
             </a:r>
             <a:endParaRPr lang="en-US" dirty="0"/>
           </a:p>
@@ -7045,15 +7147,33 @@
                                   </p:childTnLst>
                                 </p:cTn>
                               </p:par>
+                            </p:childTnLst>
+                          </p:cTn>
+                        </p:par>
+                      </p:childTnLst>
+                    </p:cTn>
+                  </p:par>
+                  <p:par>
+                    <p:cTn id="8" fill="hold">
+                      <p:stCondLst>
+                        <p:cond delay="indefinite"/>
+                      </p:stCondLst>
+                      <p:childTnLst>
+                        <p:par>
+                          <p:cTn id="9" fill="hold">
+                            <p:stCondLst>
+                              <p:cond delay="0"/>
+                            </p:stCondLst>
+                            <p:childTnLst>
                               <p:par>
-                                <p:cTn id="8" presetID="22" presetClass="entr" presetSubtype="1" fill="hold" grpId="0" nodeType="withEffect">
+                                <p:cTn id="10" presetID="22" presetClass="entr" presetSubtype="1" fill="hold" grpId="0" nodeType="clickEffect">
                                   <p:stCondLst>
                                     <p:cond delay="0"/>
                                   </p:stCondLst>
                                   <p:childTnLst>
                                     <p:set>
                                       <p:cBhvr>
-                                        <p:cTn id="9" dur="1" fill="hold">
+                                        <p:cTn id="11" dur="1" fill="hold">
                                           <p:stCondLst>
                                             <p:cond delay="0"/>
                                           </p:stCondLst>
@@ -7075,54 +7195,11 @@
                                     </p:set>
                                     <p:animEffect transition="in" filter="wipe(up)">
                                       <p:cBhvr>
-                                        <p:cTn id="10" dur="500"/>
+                                        <p:cTn id="12" dur="500"/>
                                         <p:tgtEl>
                                           <p:spTgt spid="3">
                                             <p:txEl>
                                               <p:pRg st="1" end="1"/>
-                                            </p:txEl>
-                                          </p:spTgt>
-                                        </p:tgtEl>
-                                      </p:cBhvr>
-                                    </p:animEffect>
-                                  </p:childTnLst>
-                                </p:cTn>
-                              </p:par>
-                              <p:par>
-                                <p:cTn id="11" presetID="22" presetClass="entr" presetSubtype="1" fill="hold" grpId="0" nodeType="withEffect">
-                                  <p:stCondLst>
-                                    <p:cond delay="0"/>
-                                  </p:stCondLst>
-                                  <p:childTnLst>
-                                    <p:set>
-                                      <p:cBhvr>
-                                        <p:cTn id="12" dur="1" fill="hold">
-                                          <p:stCondLst>
-                                            <p:cond delay="0"/>
-                                          </p:stCondLst>
-                                        </p:cTn>
-                                        <p:tgtEl>
-                                          <p:spTgt spid="3">
-                                            <p:txEl>
-                                              <p:pRg st="2" end="2"/>
-                                            </p:txEl>
-                                          </p:spTgt>
-                                        </p:tgtEl>
-                                        <p:attrNameLst>
-                                          <p:attrName>style.visibility</p:attrName>
-                                        </p:attrNameLst>
-                                      </p:cBhvr>
-                                      <p:to>
-                                        <p:strVal val="visible"/>
-                                      </p:to>
-                                    </p:set>
-                                    <p:animEffect transition="in" filter="wipe(up)">
-                                      <p:cBhvr>
-                                        <p:cTn id="13" dur="500"/>
-                                        <p:tgtEl>
-                                          <p:spTgt spid="3">
-                                            <p:txEl>
-                                              <p:pRg st="2" end="2"/>
                                             </p:txEl>
                                           </p:spTgt>
                                         </p:tgtEl>
@@ -7138,26 +7215,26 @@
                     </p:cTn>
                   </p:par>
                   <p:par>
-                    <p:cTn id="14" fill="hold">
+                    <p:cTn id="13" fill="hold">
                       <p:stCondLst>
                         <p:cond delay="indefinite"/>
                       </p:stCondLst>
                       <p:childTnLst>
                         <p:par>
-                          <p:cTn id="15" fill="hold">
+                          <p:cTn id="14" fill="hold">
                             <p:stCondLst>
                               <p:cond delay="0"/>
                             </p:stCondLst>
                             <p:childTnLst>
                               <p:par>
-                                <p:cTn id="16" presetID="22" presetClass="entr" presetSubtype="1" fill="hold" grpId="0" nodeType="clickEffect">
+                                <p:cTn id="15" presetID="22" presetClass="entr" presetSubtype="1" fill="hold" grpId="0" nodeType="clickEffect">
                                   <p:stCondLst>
                                     <p:cond delay="0"/>
                                   </p:stCondLst>
                                   <p:childTnLst>
                                     <p:set>
                                       <p:cBhvr>
-                                        <p:cTn id="17" dur="1" fill="hold">
+                                        <p:cTn id="16" dur="1" fill="hold">
                                           <p:stCondLst>
                                             <p:cond delay="0"/>
                                           </p:stCondLst>
@@ -7165,7 +7242,7 @@
                                         <p:tgtEl>
                                           <p:spTgt spid="3">
                                             <p:txEl>
-                                              <p:pRg st="3" end="3"/>
+                                              <p:pRg st="2" end="2"/>
                                             </p:txEl>
                                           </p:spTgt>
                                         </p:tgtEl>
@@ -7179,11 +7256,11 @@
                                     </p:set>
                                     <p:animEffect transition="in" filter="wipe(up)">
                                       <p:cBhvr>
-                                        <p:cTn id="18" dur="500"/>
+                                        <p:cTn id="17" dur="500"/>
                                         <p:tgtEl>
                                           <p:spTgt spid="3">
                                             <p:txEl>
-                                              <p:pRg st="3" end="3"/>
+                                              <p:pRg st="2" end="2"/>
                                             </p:txEl>
                                           </p:spTgt>
                                         </p:tgtEl>
@@ -7199,32 +7276,36 @@
                     </p:cTn>
                   </p:par>
                   <p:par>
-                    <p:cTn id="19" fill="hold">
+                    <p:cTn id="18" fill="hold">
                       <p:stCondLst>
                         <p:cond delay="indefinite"/>
                       </p:stCondLst>
                       <p:childTnLst>
                         <p:par>
-                          <p:cTn id="20" fill="hold">
+                          <p:cTn id="19" fill="hold">
                             <p:stCondLst>
                               <p:cond delay="0"/>
                             </p:stCondLst>
                             <p:childTnLst>
                               <p:par>
-                                <p:cTn id="21" presetID="22" presetClass="entr" presetSubtype="1" fill="hold" nodeType="clickEffect">
+                                <p:cTn id="20" presetID="22" presetClass="entr" presetSubtype="1" fill="hold" grpId="0" nodeType="clickEffect">
                                   <p:stCondLst>
                                     <p:cond delay="0"/>
                                   </p:stCondLst>
                                   <p:childTnLst>
                                     <p:set>
                                       <p:cBhvr>
-                                        <p:cTn id="22" dur="1" fill="hold">
+                                        <p:cTn id="21" dur="1" fill="hold">
                                           <p:stCondLst>
                                             <p:cond delay="0"/>
                                           </p:stCondLst>
                                         </p:cTn>
                                         <p:tgtEl>
-                                          <p:spTgt spid="5"/>
+                                          <p:spTgt spid="3">
+                                            <p:txEl>
+                                              <p:pRg st="3" end="3"/>
+                                            </p:txEl>
+                                          </p:spTgt>
                                         </p:tgtEl>
                                         <p:attrNameLst>
                                           <p:attrName>style.visibility</p:attrName>
@@ -7236,9 +7317,13 @@
                                     </p:set>
                                     <p:animEffect transition="in" filter="wipe(up)">
                                       <p:cBhvr>
-                                        <p:cTn id="23" dur="500"/>
-                                        <p:tgtEl>
-                                          <p:spTgt spid="5"/>
+                                        <p:cTn id="22" dur="500"/>
+                                        <p:tgtEl>
+                                          <p:spTgt spid="3">
+                                            <p:txEl>
+                                              <p:pRg st="3" end="3"/>
+                                            </p:txEl>
+                                          </p:spTgt>
                                         </p:tgtEl>
                                       </p:cBhvr>
                                     </p:animEffect>
@@ -7252,36 +7337,32 @@
                     </p:cTn>
                   </p:par>
                   <p:par>
-                    <p:cTn id="24" fill="hold">
+                    <p:cTn id="23" fill="hold">
                       <p:stCondLst>
                         <p:cond delay="indefinite"/>
                       </p:stCondLst>
                       <p:childTnLst>
                         <p:par>
-                          <p:cTn id="25" fill="hold">
+                          <p:cTn id="24" fill="hold">
                             <p:stCondLst>
                               <p:cond delay="0"/>
                             </p:stCondLst>
                             <p:childTnLst>
                               <p:par>
-                                <p:cTn id="26" presetID="22" presetClass="entr" presetSubtype="1" fill="hold" grpId="0" nodeType="clickEffect">
+                                <p:cTn id="25" presetID="22" presetClass="entr" presetSubtype="1" fill="hold" nodeType="clickEffect">
                                   <p:stCondLst>
                                     <p:cond delay="0"/>
                                   </p:stCondLst>
                                   <p:childTnLst>
                                     <p:set>
                                       <p:cBhvr>
-                                        <p:cTn id="27" dur="1" fill="hold">
+                                        <p:cTn id="26" dur="1" fill="hold">
                                           <p:stCondLst>
                                             <p:cond delay="0"/>
                                           </p:stCondLst>
                                         </p:cTn>
                                         <p:tgtEl>
-                                          <p:spTgt spid="3">
-                                            <p:txEl>
-                                              <p:pRg st="6" end="6"/>
-                                            </p:txEl>
-                                          </p:spTgt>
+                                          <p:spTgt spid="5"/>
                                         </p:tgtEl>
                                         <p:attrNameLst>
                                           <p:attrName>style.visibility</p:attrName>
@@ -7293,13 +7374,9 @@
                                     </p:set>
                                     <p:animEffect transition="in" filter="wipe(up)">
                                       <p:cBhvr>
-                                        <p:cTn id="28" dur="500"/>
-                                        <p:tgtEl>
-                                          <p:spTgt spid="3">
-                                            <p:txEl>
-                                              <p:pRg st="6" end="6"/>
-                                            </p:txEl>
-                                          </p:spTgt>
+                                        <p:cTn id="27" dur="500"/>
+                                        <p:tgtEl>
+                                          <p:spTgt spid="5"/>
                                         </p:tgtEl>
                                       </p:cBhvr>
                                     </p:animEffect>
@@ -7313,32 +7390,36 @@
                     </p:cTn>
                   </p:par>
                   <p:par>
-                    <p:cTn id="29" fill="hold">
+                    <p:cTn id="28" fill="hold">
                       <p:stCondLst>
                         <p:cond delay="indefinite"/>
                       </p:stCondLst>
                       <p:childTnLst>
                         <p:par>
-                          <p:cTn id="30" fill="hold">
+                          <p:cTn id="29" fill="hold">
                             <p:stCondLst>
                               <p:cond delay="0"/>
                             </p:stCondLst>
                             <p:childTnLst>
                               <p:par>
-                                <p:cTn id="31" presetID="22" presetClass="entr" presetSubtype="1" fill="hold" nodeType="clickEffect">
+                                <p:cTn id="30" presetID="22" presetClass="entr" presetSubtype="1" fill="hold" grpId="0" nodeType="clickEffect">
                                   <p:stCondLst>
                                     <p:cond delay="0"/>
                                   </p:stCondLst>
                                   <p:childTnLst>
                                     <p:set>
                                       <p:cBhvr>
-                                        <p:cTn id="32" dur="1" fill="hold">
+                                        <p:cTn id="31" dur="1" fill="hold">
                                           <p:stCondLst>
                                             <p:cond delay="0"/>
                                           </p:stCondLst>
                                         </p:cTn>
                                         <p:tgtEl>
-                                          <p:spTgt spid="6"/>
+                                          <p:spTgt spid="3">
+                                            <p:txEl>
+                                              <p:pRg st="6" end="6"/>
+                                            </p:txEl>
+                                          </p:spTgt>
                                         </p:tgtEl>
                                         <p:attrNameLst>
                                           <p:attrName>style.visibility</p:attrName>
@@ -7350,7 +7431,64 @@
                                     </p:set>
                                     <p:animEffect transition="in" filter="wipe(up)">
                                       <p:cBhvr>
-                                        <p:cTn id="33" dur="500"/>
+                                        <p:cTn id="32" dur="500"/>
+                                        <p:tgtEl>
+                                          <p:spTgt spid="3">
+                                            <p:txEl>
+                                              <p:pRg st="6" end="6"/>
+                                            </p:txEl>
+                                          </p:spTgt>
+                                        </p:tgtEl>
+                                      </p:cBhvr>
+                                    </p:animEffect>
+                                  </p:childTnLst>
+                                </p:cTn>
+                              </p:par>
+                            </p:childTnLst>
+                          </p:cTn>
+                        </p:par>
+                      </p:childTnLst>
+                    </p:cTn>
+                  </p:par>
+                  <p:par>
+                    <p:cTn id="33" fill="hold">
+                      <p:stCondLst>
+                        <p:cond delay="indefinite"/>
+                      </p:stCondLst>
+                      <p:childTnLst>
+                        <p:par>
+                          <p:cTn id="34" fill="hold">
+                            <p:stCondLst>
+                              <p:cond delay="0"/>
+                            </p:stCondLst>
+                            <p:childTnLst>
+                              <p:par>
+                                <p:cTn id="35" presetID="22" presetClass="entr" presetSubtype="1" fill="hold" nodeType="clickEffect">
+                                  <p:stCondLst>
+                                    <p:cond delay="0"/>
+                                  </p:stCondLst>
+                                  <p:childTnLst>
+                                    <p:set>
+                                      <p:cBhvr>
+                                        <p:cTn id="36" dur="1" fill="hold">
+                                          <p:stCondLst>
+                                            <p:cond delay="0"/>
+                                          </p:stCondLst>
+                                        </p:cTn>
+                                        <p:tgtEl>
+                                          <p:spTgt spid="6"/>
+                                        </p:tgtEl>
+                                        <p:attrNameLst>
+                                          <p:attrName>style.visibility</p:attrName>
+                                        </p:attrNameLst>
+                                      </p:cBhvr>
+                                      <p:to>
+                                        <p:strVal val="visible"/>
+                                      </p:to>
+                                    </p:set>
+                                    <p:animEffect transition="in" filter="wipe(up)">
+                                      <p:cBhvr>
+                                        <p:cTn id="37" dur="500"/>
                                         <p:tgtEl>
                                           <p:spTgt spid="6"/>
                                         </p:tgtEl>
@@ -7477,14 +7615,32 @@
           <a:p>
             <a:r>
               <a:rPr lang="en-US" dirty="0" smtClean="0"/>
-              <a:t>Observation: summation of per pair partial gradient.</a:t>
+              <a:t>Observation: </a:t>
             </a:r>
-          </a:p>
-          <a:p>
             <a:r>
               <a:rPr lang="en-US" dirty="0" smtClean="0"/>
-              <a:t>Stochastic Gradient Descent. </a:t>
+              <a:t>full gradient is the summation </a:t>
             </a:r>
+            <a:r>
+              <a:rPr lang="en-US" dirty="0" smtClean="0"/>
+              <a:t>of per pair partial </a:t>
+            </a:r>
+            <a:r>
+              <a:rPr lang="en-US" dirty="0" smtClean="0"/>
+              <a:t>gradient</a:t>
+            </a:r>
+            <a:endParaRPr lang="en-US" dirty="0" smtClean="0"/>
+          </a:p>
+          <a:p>
+            <a:r>
+              <a:rPr lang="en-US" dirty="0" smtClean="0"/>
+              <a:t>Stochastic Gradient </a:t>
+            </a:r>
+            <a:r>
+              <a:rPr lang="en-US" dirty="0" smtClean="0"/>
+              <a:t>Descent (SGD) </a:t>
+            </a:r>
+            <a:endParaRPr lang="en-US" dirty="0" smtClean="0"/>
           </a:p>
         </p:txBody>
       </p:sp>
@@ -8191,6 +8347,36 @@
           </p:txBody>
         </p:sp>
       </p:grpSp>
+      <p:sp>
+        <p:nvSpPr>
+          <p:cNvPr id="14" name="TextBox 13"/>
+          <p:cNvSpPr txBox="1"/>
+          <p:nvPr/>
+        </p:nvSpPr>
+        <p:spPr>
+          <a:xfrm>
+            <a:off x="0" y="6488668"/>
+            <a:ext cx="6019800" cy="369332"/>
+          </a:xfrm>
+          <a:prstGeom prst="rect">
+            <a:avLst/>
+          </a:prstGeom>
+          <a:noFill/>
+        </p:spPr>
+        <p:txBody>
+          <a:bodyPr wrap="square" rtlCol="0">
+            <a:spAutoFit/>
+          </a:bodyPr>
+          <a:lstStyle/>
+          <a:p>
+            <a:r>
+              <a:rPr lang="en-US" dirty="0" smtClean="0"/>
+              <a:t>K takes value in [-1, 1]</a:t>
+            </a:r>
+            <a:endParaRPr lang="en-US" dirty="0"/>
+          </a:p>
+        </p:txBody>
+      </p:sp>
     </p:spTree>
   </p:cSld>
   <p:clrMapOvr>
@@ -8465,6 +8651,59 @@
                                         <p:cTn id="27" dur="500"/>
                                         <p:tgtEl>
                                           <p:spTgt spid="12"/>
+                                        </p:tgtEl>
+                                      </p:cBhvr>
+                                    </p:animEffect>
+                                  </p:childTnLst>
+                                </p:cTn>
+                              </p:par>
+                            </p:childTnLst>
+                          </p:cTn>
+                        </p:par>
+                      </p:childTnLst>
+                    </p:cTn>
+                  </p:par>
+                  <p:par>
+                    <p:cTn id="28" fill="hold">
+                      <p:stCondLst>
+                        <p:cond delay="indefinite"/>
+                      </p:stCondLst>
+                      <p:childTnLst>
+                        <p:par>
+                          <p:cTn id="29" fill="hold">
+                            <p:stCondLst>
+                              <p:cond delay="0"/>
+                            </p:stCondLst>
+                            <p:childTnLst>
+                              <p:par>
+                                <p:cTn id="30" presetID="22" presetClass="entr" presetSubtype="8" fill="hold" grpId="0" nodeType="clickEffect">
+                                  <p:stCondLst>
+                                    <p:cond delay="0"/>
+                                  </p:stCondLst>
+                                  <p:childTnLst>
+                                    <p:set>
+                                      <p:cBhvr>
+                                        <p:cTn id="31" dur="1" fill="hold">
+                                          <p:stCondLst>
+                                            <p:cond delay="0"/>
+                                          </p:stCondLst>
+                                        </p:cTn>
+                                        <p:tgtEl>
+                                          <p:spTgt spid="14"/>
+                                        </p:tgtEl>
+                                        <p:attrNameLst>
+                                          <p:attrName>style.visibility</p:attrName>
+                                        </p:attrNameLst>
+                                      </p:cBhvr>
+                                      <p:to>
+                                        <p:strVal val="visible"/>
+                                      </p:to>
+                                    </p:set>
+                                    <p:animEffect transition="in" filter="wipe(left)">
+                                      <p:cBhvr>
+                                        <p:cTn id="32" dur="500"/>
+                                        <p:tgtEl>
+                                          <p:spTgt spid="14"/>
                                         </p:tgtEl>
                                       </p:cBhvr>
                                     </p:animEffect>
@@ -8500,6 +8739,7 @@
     </p:tnLst>
     <p:bldLst>
       <p:bldP spid="3" grpId="0" build="p"/>
+      <p:bldP spid="14" grpId="0"/>
     </p:bldLst>
   </p:timing>
 </p:sld>
@@ -14724,6 +14964,73 @@
           </a:p>
         </p:txBody>
       </p:sp>
+      <p:sp>
+        <p:nvSpPr>
+          <p:cNvPr id="4" name="TextBox 3"/>
+          <p:cNvSpPr txBox="1"/>
+          <p:nvPr/>
+        </p:nvSpPr>
+        <p:spPr>
+          <a:xfrm>
+            <a:off x="4419600" y="0"/>
+            <a:ext cx="4876800" cy="1169551"/>
+          </a:xfrm>
+          <a:prstGeom prst="rect">
+            <a:avLst/>
+          </a:prstGeom>
+          <a:noFill/>
+        </p:spPr>
+        <p:txBody>
+          <a:bodyPr wrap="square" rtlCol="0">
+            <a:spAutoFit/>
+          </a:bodyPr>
+          <a:lstStyle/>
+          <a:p>
+            <a:r>
+              <a:rPr lang="en-US" sz="1400" dirty="0" smtClean="0"/>
+              <a:t>Join SNSAPI development!</a:t>
+            </a:r>
+          </a:p>
+          <a:p>
+            <a:r>
+              <a:rPr lang="en-US" sz="1400" dirty="0" smtClean="0"/>
+              <a:t>   - https://github.com/hupili/snsapi/</a:t>
+            </a:r>
+            <a:endParaRPr lang="en-US" sz="1400" dirty="0" smtClean="0"/>
+          </a:p>
+          <a:p>
+            <a:r>
+              <a:rPr lang="en-US" sz="1400" dirty="0" smtClean="0"/>
+              <a:t>   - Towards </a:t>
+            </a:r>
+            <a:r>
+              <a:rPr lang="en-US" sz="1400" dirty="0" smtClean="0"/>
+              <a:t>a</a:t>
+            </a:r>
+            <a:r>
+              <a:rPr lang="en-US" sz="1400" dirty="0" smtClean="0"/>
+              <a:t> free / safe / reliable Social Network Overlay.</a:t>
+            </a:r>
+          </a:p>
+          <a:p>
+            <a:r>
+              <a:rPr lang="en-US" sz="1400" dirty="0" smtClean="0"/>
+              <a:t>In support of Free Web Action:</a:t>
+            </a:r>
+          </a:p>
+          <a:p>
+            <a:r>
+              <a:rPr lang="en-US" sz="1400" dirty="0" smtClean="0"/>
+              <a:t>   - https</a:t>
+            </a:r>
+            <a:r>
+              <a:rPr lang="en-US" sz="1400" dirty="0" smtClean="0"/>
+              <a:t>://www.google.com/takeaction/</a:t>
+            </a:r>
+            <a:endParaRPr lang="en-US" sz="1400" dirty="0"/>
+          </a:p>
+        </p:txBody>
+      </p:sp>
     </p:spTree>
   </p:cSld>
   <p:clrMapOvr>
@@ -14796,7 +15103,11 @@
           <a:p>
             <a:r>
               <a:rPr lang="en-US" dirty="0" smtClean="0"/>
-              <a:t>Avoid echo:</a:t>
+              <a:t>Cancel </a:t>
+            </a:r>
+            <a:r>
+              <a:rPr lang="en-US" dirty="0" smtClean="0"/>
+              <a:t>echo:</a:t>
             </a:r>
           </a:p>
           <a:p>
@@ -15060,6 +15371,65 @@
           </p:txBody>
         </p:sp>
       </p:grpSp>
+      <p:sp>
+        <p:nvSpPr>
+          <p:cNvPr id="12" name="TextBox 11"/>
+          <p:cNvSpPr txBox="1"/>
+          <p:nvPr/>
+        </p:nvSpPr>
+        <p:spPr>
+          <a:xfrm>
+            <a:off x="0" y="5657671"/>
+            <a:ext cx="3733800" cy="1200329"/>
+          </a:xfrm>
+          <a:prstGeom prst="rect">
+            <a:avLst/>
+          </a:prstGeom>
+          <a:noFill/>
+        </p:spPr>
+        <p:txBody>
+          <a:bodyPr wrap="square" rtlCol="0">
+            <a:spAutoFit/>
+          </a:bodyPr>
+          <a:lstStyle/>
+          <a:p>
+            <a:r>
+              <a:rPr lang="en-US" dirty="0" smtClean="0"/>
+              <a:t>Most platforms will echo the message you post there, but they do not give you more information. We want to SOFTLY cancel them.</a:t>
+            </a:r>
+          </a:p>
+        </p:txBody>
+      </p:sp>
+      <p:sp>
+        <p:nvSpPr>
+          <p:cNvPr id="13" name="TextBox 12"/>
+          <p:cNvSpPr txBox="1"/>
+          <p:nvPr/>
+        </p:nvSpPr>
+        <p:spPr>
+          <a:xfrm>
+            <a:off x="0" y="0"/>
+            <a:ext cx="1219200" cy="261610"/>
+          </a:xfrm>
+          <a:prstGeom prst="rect">
+            <a:avLst/>
+          </a:prstGeom>
+          <a:noFill/>
+        </p:spPr>
+        <p:txBody>
+          <a:bodyPr wrap="square" rtlCol="0">
+            <a:spAutoFit/>
+          </a:bodyPr>
+          <a:lstStyle/>
+          <a:p>
+            <a:r>
+              <a:rPr lang="en-US" sz="1100" dirty="0" smtClean="0"/>
+              <a:t>Backup slides</a:t>
+            </a:r>
+            <a:endParaRPr lang="en-US" sz="1100" dirty="0"/>
+          </a:p>
+        </p:txBody>
+      </p:sp>
     </p:spTree>
   </p:cSld>
   <p:clrMapOvr>
@@ -15129,7 +15499,7 @@
                                 </p:cTn>
                               </p:par>
                               <p:par>
-                                <p:cTn id="8" presetID="2" presetClass="entr" presetSubtype="2" fill="hold" nodeType="withEffect">
+                                <p:cTn id="8" presetID="22" presetClass="entr" presetSubtype="8" fill="hold" grpId="0" nodeType="withEffect">
                                   <p:stCondLst>
                                     <p:cond delay="0"/>
                                   </p:stCondLst>
@@ -15137,6 +15507,41 @@
                                     <p:set>
                                       <p:cBhvr>
                                         <p:cTn id="9" dur="1" fill="hold">
+                                          <p:stCondLst>
+                                            <p:cond delay="0"/>
+                                          </p:stCondLst>
+                                        </p:cTn>
+                                        <p:tgtEl>
+                                          <p:spTgt spid="12"/>
+                                        </p:tgtEl>
+                                        <p:attrNameLst>
+                                          <p:attrName>style.visibility</p:attrName>
+                                        </p:attrNameLst>
+                                      </p:cBhvr>
+                                      <p:to>
+                                        <p:strVal val="visible"/>
+                                      </p:to>
+                                    </p:set>
+                                    <p:animEffect transition="in" filter="wipe(left)">
+                                      <p:cBhvr>
+                                        <p:cTn id="10" dur="500"/>
+                                        <p:tgtEl>
+                                          <p:spTgt spid="12"/>
+                                        </p:tgtEl>
+                                      </p:cBhvr>
+                                    </p:animEffect>
+                                  </p:childTnLst>
+                                </p:cTn>
+                              </p:par>
+                              <p:par>
+                                <p:cTn id="11" presetID="2" presetClass="entr" presetSubtype="2" fill="hold" nodeType="withEffect">
+                                  <p:stCondLst>
+                                    <p:cond delay="0"/>
+                                  </p:stCondLst>
+                                  <p:childTnLst>
+                                    <p:set>
+                                      <p:cBhvr>
+                                        <p:cTn id="12" dur="1" fill="hold">
                                           <p:stCondLst>
                                             <p:cond delay="0"/>
                                           </p:stCondLst>
@@ -15154,7 +15559,7 @@
                                     </p:set>
                                     <p:anim calcmode="lin" valueType="num">
                                       <p:cBhvr additive="base">
-                                        <p:cTn id="10" dur="500" fill="hold"/>
+                                        <p:cTn id="13" dur="500" fill="hold"/>
                                         <p:tgtEl>
                                           <p:spTgt spid="30724"/>
                                         </p:tgtEl>
@@ -15177,7 +15582,7 @@
                                     </p:anim>
                                     <p:anim calcmode="lin" valueType="num">
                                       <p:cBhvr additive="base">
-                                        <p:cTn id="11" dur="500" fill="hold"/>
+                                        <p:cTn id="14" dur="500" fill="hold"/>
                                         <p:tgtEl>
                                           <p:spTgt spid="30724"/>
                                         </p:tgtEl>
@@ -15208,26 +15613,26 @@
                     </p:cTn>
                   </p:par>
                   <p:par>
-                    <p:cTn id="12" fill="hold">
+                    <p:cTn id="15" fill="hold">
                       <p:stCondLst>
                         <p:cond delay="indefinite"/>
                       </p:stCondLst>
                       <p:childTnLst>
                         <p:par>
-                          <p:cTn id="13" fill="hold">
+                          <p:cTn id="16" fill="hold">
                             <p:stCondLst>
                               <p:cond delay="0"/>
                             </p:stCondLst>
                             <p:childTnLst>
                               <p:par>
-                                <p:cTn id="14" presetID="22" presetClass="entr" presetSubtype="1" fill="hold" grpId="0" nodeType="clickEffect">
+                                <p:cTn id="17" presetID="22" presetClass="entr" presetSubtype="1" fill="hold" grpId="0" nodeType="clickEffect">
                                   <p:stCondLst>
                                     <p:cond delay="0"/>
                                   </p:stCondLst>
                                   <p:childTnLst>
                                     <p:set>
                                       <p:cBhvr>
-                                        <p:cTn id="15" dur="1" fill="hold">
+                                        <p:cTn id="18" dur="1" fill="hold">
                                           <p:stCondLst>
                                             <p:cond delay="0"/>
                                           </p:stCondLst>
@@ -15249,7 +15654,7 @@
                                     </p:set>
                                     <p:animEffect transition="in" filter="wipe(up)">
                                       <p:cBhvr>
-                                        <p:cTn id="16" dur="500"/>
+                                        <p:cTn id="19" dur="500"/>
                                         <p:tgtEl>
                                           <p:spTgt spid="3">
                                             <p:txEl>
@@ -15263,14 +15668,14 @@
                                 </p:cTn>
                               </p:par>
                               <p:par>
-                                <p:cTn id="17" presetID="2" presetClass="exit" presetSubtype="2" fill="hold" nodeType="withEffect">
+                                <p:cTn id="20" presetID="2" presetClass="exit" presetSubtype="2" fill="hold" nodeType="withEffect">
                                   <p:stCondLst>
                                     <p:cond delay="0"/>
                                   </p:stCondLst>
                                   <p:childTnLst>
                                     <p:anim calcmode="lin" valueType="num">
                                       <p:cBhvr additive="base">
-                                        <p:cTn id="18" dur="500"/>
+                                        <p:cTn id="21" dur="500"/>
                                         <p:tgtEl>
                                           <p:spTgt spid="30724"/>
                                         </p:tgtEl>
@@ -15293,7 +15698,7 @@
                                     </p:anim>
                                     <p:anim calcmode="lin" valueType="num">
                                       <p:cBhvr additive="base">
-                                        <p:cTn id="19" dur="500"/>
+                                        <p:cTn id="22" dur="500"/>
                                         <p:tgtEl>
                                           <p:spTgt spid="30724"/>
                                         </p:tgtEl>
@@ -15316,7 +15721,7 @@
                                     </p:anim>
                                     <p:set>
                                       <p:cBhvr>
-                                        <p:cTn id="20" dur="1" fill="hold">
+                                        <p:cTn id="23" dur="1" fill="hold">
                                           <p:stCondLst>
                                             <p:cond delay="499"/>
                                           </p:stCondLst>
@@ -15336,14 +15741,14 @@
                                 </p:cTn>
                               </p:par>
                               <p:par>
-                                <p:cTn id="21" presetID="2" presetClass="entr" presetSubtype="2" fill="hold" nodeType="withEffect">
+                                <p:cTn id="24" presetID="2" presetClass="entr" presetSubtype="2" fill="hold" nodeType="withEffect">
                                   <p:stCondLst>
                                     <p:cond delay="0"/>
                                   </p:stCondLst>
                                   <p:childTnLst>
                                     <p:set>
                                       <p:cBhvr>
-                                        <p:cTn id="22" dur="1" fill="hold">
+                                        <p:cTn id="25" dur="1" fill="hold">
                                           <p:stCondLst>
                                             <p:cond delay="0"/>
                                           </p:stCondLst>
@@ -15361,7 +15766,7 @@
                                     </p:set>
                                     <p:anim calcmode="lin" valueType="num">
                                       <p:cBhvr additive="base">
-                                        <p:cTn id="23" dur="500" fill="hold"/>
+                                        <p:cTn id="26" dur="500" fill="hold"/>
                                         <p:tgtEl>
                                           <p:spTgt spid="11"/>
                                         </p:tgtEl>
@@ -15384,7 +15789,7 @@
                                     </p:anim>
                                     <p:anim calcmode="lin" valueType="num">
                                       <p:cBhvr additive="base">
-                                        <p:cTn id="24" dur="500" fill="hold"/>
+                                        <p:cTn id="27" dur="500" fill="hold"/>
                                         <p:tgtEl>
                                           <p:spTgt spid="11"/>
                                         </p:tgtEl>
@@ -15415,26 +15820,26 @@
                     </p:cTn>
                   </p:par>
                   <p:par>
-                    <p:cTn id="25" fill="hold">
+                    <p:cTn id="28" fill="hold">
                       <p:stCondLst>
                         <p:cond delay="indefinite"/>
                       </p:stCondLst>
                       <p:childTnLst>
                         <p:par>
-                          <p:cTn id="26" fill="hold">
+                          <p:cTn id="29" fill="hold">
                             <p:stCondLst>
                               <p:cond delay="0"/>
                             </p:stCondLst>
                             <p:childTnLst>
                               <p:par>
-                                <p:cTn id="27" presetID="22" presetClass="entr" presetSubtype="1" fill="hold" grpId="0" nodeType="clickEffect">
+                                <p:cTn id="30" presetID="22" presetClass="entr" presetSubtype="1" fill="hold" grpId="0" nodeType="clickEffect">
                                   <p:stCondLst>
                                     <p:cond delay="0"/>
                                   </p:stCondLst>
                                   <p:childTnLst>
                                     <p:set>
                                       <p:cBhvr>
-                                        <p:cTn id="28" dur="1" fill="hold">
+                                        <p:cTn id="31" dur="1" fill="hold">
                                           <p:stCondLst>
                                             <p:cond delay="0"/>
                                           </p:stCondLst>
@@ -15456,7 +15861,7 @@
                                     </p:set>
                                     <p:animEffect transition="in" filter="wipe(up)">
                                       <p:cBhvr>
-                                        <p:cTn id="29" dur="500"/>
+                                        <p:cTn id="32" dur="500"/>
                                         <p:tgtEl>
                                           <p:spTgt spid="3">
                                             <p:txEl>
@@ -15470,14 +15875,14 @@
                                 </p:cTn>
                               </p:par>
                               <p:par>
-                                <p:cTn id="30" presetID="2" presetClass="exit" presetSubtype="2" fill="hold" nodeType="withEffect">
+                                <p:cTn id="33" presetID="2" presetClass="exit" presetSubtype="2" fill="hold" nodeType="withEffect">
                                   <p:stCondLst>
                                     <p:cond delay="0"/>
                                   </p:stCondLst>
                                   <p:childTnLst>
                                     <p:anim calcmode="lin" valueType="num">
                                       <p:cBhvr additive="base">
-                                        <p:cTn id="31" dur="500"/>
+                                        <p:cTn id="34" dur="500"/>
                                         <p:tgtEl>
                                           <p:spTgt spid="11"/>
                                         </p:tgtEl>
@@ -15500,7 +15905,7 @@
                                     </p:anim>
                                     <p:anim calcmode="lin" valueType="num">
                                       <p:cBhvr additive="base">
-                                        <p:cTn id="32" dur="500"/>
+                                        <p:cTn id="35" dur="500"/>
                                         <p:tgtEl>
                                           <p:spTgt spid="11"/>
                                         </p:tgtEl>
@@ -15523,7 +15928,7 @@
                                     </p:anim>
                                     <p:set>
                                       <p:cBhvr>
-                                        <p:cTn id="33" dur="1" fill="hold">
+                                        <p:cTn id="36" dur="1" fill="hold">
                                           <p:stCondLst>
                                             <p:cond delay="499"/>
                                           </p:stCondLst>
@@ -15543,14 +15948,14 @@
                                 </p:cTn>
                               </p:par>
                               <p:par>
-                                <p:cTn id="34" presetID="2" presetClass="entr" presetSubtype="2" fill="hold" nodeType="withEffect">
+                                <p:cTn id="37" presetID="2" presetClass="entr" presetSubtype="2" fill="hold" nodeType="withEffect">
                                   <p:stCondLst>
                                     <p:cond delay="0"/>
                                   </p:stCondLst>
                                   <p:childTnLst>
                                     <p:set>
                                       <p:cBhvr>
-                                        <p:cTn id="35" dur="1" fill="hold">
+                                        <p:cTn id="38" dur="1" fill="hold">
                                           <p:stCondLst>
                                             <p:cond delay="0"/>
                                           </p:stCondLst>
@@ -15568,7 +15973,7 @@
                                     </p:set>
                                     <p:anim calcmode="lin" valueType="num">
                                       <p:cBhvr additive="base">
-                                        <p:cTn id="36" dur="500" fill="hold"/>
+                                        <p:cTn id="39" dur="500" fill="hold"/>
                                         <p:tgtEl>
                                           <p:spTgt spid="9"/>
                                         </p:tgtEl>
@@ -15591,7 +15996,7 @@
                                     </p:anim>
                                     <p:anim calcmode="lin" valueType="num">
                                       <p:cBhvr additive="base">
-                                        <p:cTn id="37" dur="500" fill="hold"/>
+                                        <p:cTn id="40" dur="500" fill="hold"/>
                                         <p:tgtEl>
                                           <p:spTgt spid="9"/>
                                         </p:tgtEl>
@@ -15622,26 +16027,26 @@
                     </p:cTn>
                   </p:par>
                   <p:par>
-                    <p:cTn id="38" fill="hold">
+                    <p:cTn id="41" fill="hold">
                       <p:stCondLst>
                         <p:cond delay="indefinite"/>
                       </p:stCondLst>
                       <p:childTnLst>
                         <p:par>
-                          <p:cTn id="39" fill="hold">
+                          <p:cTn id="42" fill="hold">
                             <p:stCondLst>
                               <p:cond delay="0"/>
                             </p:stCondLst>
                             <p:childTnLst>
                               <p:par>
-                                <p:cTn id="40" presetID="22" presetClass="entr" presetSubtype="1" fill="hold" grpId="0" nodeType="clickEffect">
+                                <p:cTn id="43" presetID="22" presetClass="entr" presetSubtype="1" fill="hold" grpId="0" nodeType="clickEffect">
                                   <p:stCondLst>
                                     <p:cond delay="0"/>
                                   </p:stCondLst>
                                   <p:childTnLst>
                                     <p:set>
                                       <p:cBhvr>
-                                        <p:cTn id="41" dur="1" fill="hold">
+                                        <p:cTn id="44" dur="1" fill="hold">
                                           <p:stCondLst>
                                             <p:cond delay="0"/>
                                           </p:stCondLst>
@@ -15663,7 +16068,7 @@
                                     </p:set>
                                     <p:animEffect transition="in" filter="wipe(up)">
                                       <p:cBhvr>
-                                        <p:cTn id="42" dur="500"/>
+                                        <p:cTn id="45" dur="500"/>
                                         <p:tgtEl>
                                           <p:spTgt spid="3">
                                             <p:txEl>
@@ -15677,14 +16082,14 @@
                                 </p:cTn>
                               </p:par>
                               <p:par>
-                                <p:cTn id="43" presetID="2" presetClass="exit" presetSubtype="2" fill="hold" nodeType="withEffect">
+                                <p:cTn id="46" presetID="2" presetClass="exit" presetSubtype="2" fill="hold" nodeType="withEffect">
                                   <p:stCondLst>
                                     <p:cond delay="0"/>
                                   </p:stCondLst>
                                   <p:childTnLst>
                                     <p:anim calcmode="lin" valueType="num">
                                       <p:cBhvr additive="base">
-                                        <p:cTn id="44" dur="500"/>
+                                        <p:cTn id="47" dur="500"/>
                                         <p:tgtEl>
                                           <p:spTgt spid="9"/>
                                         </p:tgtEl>
@@ -15707,7 +16112,7 @@
                                     </p:anim>
                                     <p:anim calcmode="lin" valueType="num">
                                       <p:cBhvr additive="base">
-                                        <p:cTn id="45" dur="500"/>
+                                        <p:cTn id="48" dur="500"/>
                                         <p:tgtEl>
                                           <p:spTgt spid="9"/>
                                         </p:tgtEl>
@@ -15730,7 +16135,7 @@
                                     </p:anim>
                                     <p:set>
                                       <p:cBhvr>
-                                        <p:cTn id="46" dur="1" fill="hold">
+                                        <p:cTn id="49" dur="1" fill="hold">
                                           <p:stCondLst>
                                             <p:cond delay="499"/>
                                           </p:stCondLst>
@@ -15750,14 +16155,14 @@
                                 </p:cTn>
                               </p:par>
                               <p:par>
-                                <p:cTn id="47" presetID="2" presetClass="entr" presetSubtype="2" fill="hold" nodeType="withEffect">
+                                <p:cTn id="50" presetID="2" presetClass="entr" presetSubtype="2" fill="hold" nodeType="withEffect">
                                   <p:stCondLst>
                                     <p:cond delay="0"/>
                                   </p:stCondLst>
                                   <p:childTnLst>
                                     <p:set>
                                       <p:cBhvr>
-                                        <p:cTn id="48" dur="1" fill="hold">
+                                        <p:cTn id="51" dur="1" fill="hold">
                                           <p:stCondLst>
                                             <p:cond delay="0"/>
                                           </p:stCondLst>
@@ -15775,7 +16180,7 @@
                                     </p:set>
                                     <p:anim calcmode="lin" valueType="num">
                                       <p:cBhvr additive="base">
-                                        <p:cTn id="49" dur="500" fill="hold"/>
+                                        <p:cTn id="52" dur="500" fill="hold"/>
                                         <p:tgtEl>
                                           <p:spTgt spid="30723"/>
                                         </p:tgtEl>
@@ -15798,7 +16203,7 @@
                                     </p:anim>
                                     <p:anim calcmode="lin" valueType="num">
                                       <p:cBhvr additive="base">
-                                        <p:cTn id="50" dur="500" fill="hold"/>
+                                        <p:cTn id="53" dur="500" fill="hold"/>
                                         <p:tgtEl>
                                           <p:spTgt spid="30723"/>
                                         </p:tgtEl>
@@ -15829,26 +16234,26 @@
                     </p:cTn>
                   </p:par>
                   <p:par>
-                    <p:cTn id="51" fill="hold">
+                    <p:cTn id="54" fill="hold">
                       <p:stCondLst>
                         <p:cond delay="indefinite"/>
                       </p:stCondLst>
                       <p:childTnLst>
                         <p:par>
-                          <p:cTn id="52" fill="hold">
+                          <p:cTn id="55" fill="hold">
                             <p:stCondLst>
                               <p:cond delay="0"/>
                             </p:stCondLst>
                             <p:childTnLst>
                               <p:par>
-                                <p:cTn id="53" presetID="22" presetClass="entr" presetSubtype="1" fill="hold" grpId="0" nodeType="clickEffect">
+                                <p:cTn id="56" presetID="22" presetClass="entr" presetSubtype="1" fill="hold" grpId="0" nodeType="clickEffect">
                                   <p:stCondLst>
                                     <p:cond delay="0"/>
                                   </p:stCondLst>
                                   <p:childTnLst>
                                     <p:set>
                                       <p:cBhvr>
-                                        <p:cTn id="54" dur="1" fill="hold">
+                                        <p:cTn id="57" dur="1" fill="hold">
                                           <p:stCondLst>
                                             <p:cond delay="0"/>
                                           </p:stCondLst>
@@ -15870,7 +16275,7 @@
                                     </p:set>
                                     <p:animEffect transition="in" filter="wipe(up)">
                                       <p:cBhvr>
-                                        <p:cTn id="55" dur="500"/>
+                                        <p:cTn id="58" dur="500"/>
                                         <p:tgtEl>
                                           <p:spTgt spid="3">
                                             <p:txEl>
@@ -15884,14 +16289,14 @@
                                 </p:cTn>
                               </p:par>
                               <p:par>
-                                <p:cTn id="56" presetID="2" presetClass="exit" presetSubtype="2" fill="hold" nodeType="withEffect">
+                                <p:cTn id="59" presetID="2" presetClass="exit" presetSubtype="2" fill="hold" nodeType="withEffect">
                                   <p:stCondLst>
                                     <p:cond delay="0"/>
                                   </p:stCondLst>
                                   <p:childTnLst>
                                     <p:anim calcmode="lin" valueType="num">
                                       <p:cBhvr additive="base">
-                                        <p:cTn id="57" dur="500"/>
+                                        <p:cTn id="60" dur="500"/>
                                         <p:tgtEl>
                                           <p:spTgt spid="30723"/>
                                         </p:tgtEl>
@@ -15914,7 +16319,7 @@
                                     </p:anim>
                                     <p:anim calcmode="lin" valueType="num">
                                       <p:cBhvr additive="base">
-                                        <p:cTn id="58" dur="500"/>
+                                        <p:cTn id="61" dur="500"/>
                                         <p:tgtEl>
                                           <p:spTgt spid="30723"/>
                                         </p:tgtEl>
@@ -15937,7 +16342,7 @@
                                     </p:anim>
                                     <p:set>
                                       <p:cBhvr>
-                                        <p:cTn id="59" dur="1" fill="hold">
+                                        <p:cTn id="62" dur="1" fill="hold">
                                           <p:stCondLst>
                                             <p:cond delay="499"/>
                                           </p:stCondLst>
@@ -15985,6 +16390,7 @@
     </p:tnLst>
     <p:bldLst>
       <p:bldP spid="3" grpId="0" uiExpand="1" build="p"/>
+      <p:bldP spid="12" grpId="0"/>
     </p:bldLst>
   </p:timing>
 </p:sld>
@@ -16135,19 +16541,78 @@
         </p:spPr>
         <p:style>
           <a:lnRef idx="2">
-            <a:schemeClr val="accent1"/>
+            <a:schemeClr val="dk1"/>
           </a:lnRef>
           <a:fillRef idx="0">
-            <a:schemeClr val="accent1"/>
+            <a:schemeClr val="dk1"/>
           </a:fillRef>
           <a:effectRef idx="1">
-            <a:schemeClr val="accent1"/>
+            <a:schemeClr val="dk1"/>
           </a:effectRef>
           <a:fontRef idx="minor">
             <a:schemeClr val="tx1"/>
           </a:fontRef>
         </p:style>
       </p:cxnSp>
+      <p:sp>
+        <p:nvSpPr>
+          <p:cNvPr id="8" name="TextBox 7"/>
+          <p:cNvSpPr txBox="1"/>
+          <p:nvPr/>
+        </p:nvSpPr>
+        <p:spPr>
+          <a:xfrm>
+            <a:off x="0" y="6211669"/>
+            <a:ext cx="9144000" cy="646331"/>
+          </a:xfrm>
+          <a:prstGeom prst="rect">
+            <a:avLst/>
+          </a:prstGeom>
+          <a:noFill/>
+        </p:spPr>
+        <p:txBody>
+          <a:bodyPr wrap="square" rtlCol="0">
+            <a:spAutoFit/>
+          </a:bodyPr>
+          <a:lstStyle/>
+          <a:p>
+            <a:r>
+              <a:rPr lang="en-US" dirty="0" smtClean="0"/>
+              <a:t>The weight of “echo” feature goes down iteration by iteration. Messages with “echo=1” will be ranked lower. This is auto learned by our RPR-SGD framework.</a:t>
+            </a:r>
+          </a:p>
+        </p:txBody>
+      </p:sp>
+      <p:sp>
+        <p:nvSpPr>
+          <p:cNvPr id="9" name="TextBox 8"/>
+          <p:cNvSpPr txBox="1"/>
+          <p:nvPr/>
+        </p:nvSpPr>
+        <p:spPr>
+          <a:xfrm>
+            <a:off x="0" y="0"/>
+            <a:ext cx="1219200" cy="261610"/>
+          </a:xfrm>
+          <a:prstGeom prst="rect">
+            <a:avLst/>
+          </a:prstGeom>
+          <a:noFill/>
+        </p:spPr>
+        <p:txBody>
+          <a:bodyPr wrap="square" rtlCol="0">
+            <a:spAutoFit/>
+          </a:bodyPr>
+          <a:lstStyle/>
+          <a:p>
+            <a:r>
+              <a:rPr lang="en-US" sz="1100" dirty="0" smtClean="0"/>
+              <a:t>Backup slides</a:t>
+            </a:r>
+            <a:endParaRPr lang="en-US" sz="1100" dirty="0"/>
+          </a:p>
+        </p:txBody>
+      </p:sp>
     </p:spTree>
   </p:cSld>
   <p:clrMapOvr>
@@ -16367,6 +16832,41 @@
                                   </p:childTnLst>
                                 </p:cTn>
                               </p:par>
+                              <p:par>
+                                <p:cTn id="23" presetID="22" presetClass="entr" presetSubtype="8" fill="hold" grpId="0" nodeType="withEffect">
+                                  <p:stCondLst>
+                                    <p:cond delay="0"/>
+                                  </p:stCondLst>
+                                  <p:childTnLst>
+                                    <p:set>
+                                      <p:cBhvr>
+                                        <p:cTn id="24" dur="1" fill="hold">
+                                          <p:stCondLst>
+                                            <p:cond delay="0"/>
+                                          </p:stCondLst>
+                                        </p:cTn>
+                                        <p:tgtEl>
+                                          <p:spTgt spid="8"/>
+                                        </p:tgtEl>
+                                        <p:attrNameLst>
+                                          <p:attrName>style.visibility</p:attrName>
+                                        </p:attrNameLst>
+                                      </p:cBhvr>
+                                      <p:to>
+                                        <p:strVal val="visible"/>
+                                      </p:to>
+                                    </p:set>
+                                    <p:animEffect transition="in" filter="wipe(left)">
+                                      <p:cBhvr>
+                                        <p:cTn id="25" dur="500"/>
+                                        <p:tgtEl>
+                                          <p:spTgt spid="8"/>
+                                        </p:tgtEl>
+                                      </p:cBhvr>
+                                    </p:animEffect>
+                                  </p:childTnLst>
+                                </p:cTn>
+                              </p:par>
                             </p:childTnLst>
                           </p:cTn>
                         </p:par>
@@ -16394,6 +16894,9 @@
         </p:cTn>
       </p:par>
     </p:tnLst>
+    <p:bldLst>
+      <p:bldP spid="8" grpId="0"/>
+    </p:bldLst>
   </p:timing>
 </p:sld>
 </file>
@@ -17039,6 +17542,36 @@
           </a:graphicData>
         </a:graphic>
       </p:graphicFrame>
+      <p:sp>
+        <p:nvSpPr>
+          <p:cNvPr id="4" name="TextBox 3"/>
+          <p:cNvSpPr txBox="1"/>
+          <p:nvPr/>
+        </p:nvSpPr>
+        <p:spPr>
+          <a:xfrm>
+            <a:off x="0" y="0"/>
+            <a:ext cx="1219200" cy="261610"/>
+          </a:xfrm>
+          <a:prstGeom prst="rect">
+            <a:avLst/>
+          </a:prstGeom>
+          <a:noFill/>
+        </p:spPr>
+        <p:txBody>
+          <a:bodyPr wrap="square" rtlCol="0">
+            <a:spAutoFit/>
+          </a:bodyPr>
+          <a:lstStyle/>
+          <a:p>
+            <a:r>
+              <a:rPr lang="en-US" sz="1100" dirty="0" smtClean="0"/>
+              <a:t>Backup slides</a:t>
+            </a:r>
+            <a:endParaRPr lang="en-US" sz="1100" dirty="0"/>
+          </a:p>
+        </p:txBody>
+      </p:sp>
     </p:spTree>
   </p:cSld>
   <p:clrMapOvr>
@@ -17088,65 +17621,401 @@
           <a:p>
             <a:r>
               <a:rPr lang="en-US" dirty="0" smtClean="0"/>
-              <a:t>Future Works -- System</a:t>
+              <a:t>Reaction to noise</a:t>
             </a:r>
             <a:endParaRPr lang="en-US" dirty="0"/>
+          </a:p>
+        </p:txBody>
+      </p:sp>
+      <p:graphicFrame>
+        <p:nvGraphicFramePr>
+          <p:cNvPr id="4" name="Content Placeholder 3"/>
+          <p:cNvGraphicFramePr>
+            <a:graphicFrameLocks noGrp="1"/>
+          </p:cNvGraphicFramePr>
+          <p:nvPr>
+            <p:ph idx="1"/>
+          </p:nvPr>
+        </p:nvGraphicFramePr>
+        <p:xfrm>
+          <a:off x="1295400" y="4343400"/>
+          <a:ext cx="6172200" cy="1112520"/>
+        </p:xfrm>
+        <a:graphic>
+          <a:graphicData uri="http://schemas.openxmlformats.org/drawingml/2006/table">
+            <a:tbl>
+              <a:tblPr firstRow="1" bandRow="1">
+                <a:tableStyleId>{5C22544A-7EE6-4342-B048-85BDC9FD1C3A}</a:tableStyleId>
+              </a:tblPr>
+              <a:tblGrid>
+                <a:gridCol w="1493520"/>
+                <a:gridCol w="1173480"/>
+                <a:gridCol w="1813560"/>
+                <a:gridCol w="1691640"/>
+              </a:tblGrid>
+              <a:tr h="370840">
+                <a:tc>
+                  <a:txBody>
+                    <a:bodyPr/>
+                    <a:lstStyle/>
+                    <a:p>
+                      <a:endParaRPr lang="en-US" dirty="0"/>
+                    </a:p>
+                  </a:txBody>
+                  <a:tcPr/>
+                </a:tc>
+                <a:tc>
+                  <a:txBody>
+                    <a:bodyPr/>
+                    <a:lstStyle/>
+                    <a:p>
+                      <a:r>
+                        <a:rPr lang="en-US" dirty="0" smtClean="0"/>
+                        <a:t>Init</a:t>
+                      </a:r>
+                      <a:endParaRPr lang="en-US" dirty="0"/>
+                    </a:p>
+                  </a:txBody>
+                  <a:tcPr/>
+                </a:tc>
+                <a:tc>
+                  <a:txBody>
+                    <a:bodyPr/>
+                    <a:lstStyle/>
+                    <a:p>
+                      <a:r>
+                        <a:rPr lang="en-US" dirty="0" smtClean="0"/>
+                        <a:t>Round=200K</a:t>
+                      </a:r>
+                      <a:endParaRPr lang="en-US" dirty="0"/>
+                    </a:p>
+                  </a:txBody>
+                  <a:tcPr/>
+                </a:tc>
+                <a:tc>
+                  <a:txBody>
+                    <a:bodyPr/>
+                    <a:lstStyle/>
+                    <a:p>
+                      <a:r>
+                        <a:rPr lang="en-US" dirty="0" smtClean="0"/>
+                        <a:t>Round=400K</a:t>
+                      </a:r>
+                      <a:endParaRPr lang="en-US" dirty="0"/>
+                    </a:p>
+                  </a:txBody>
+                  <a:tcPr/>
+                </a:tc>
+              </a:tr>
+              <a:tr h="370840">
+                <a:tc>
+                  <a:txBody>
+                    <a:bodyPr/>
+                    <a:lstStyle/>
+                    <a:p>
+                      <a:r>
+                        <a:rPr lang="en-US" dirty="0" smtClean="0"/>
+                        <a:t>Kendall</a:t>
+                      </a:r>
+                      <a:endParaRPr lang="en-US" dirty="0"/>
+                    </a:p>
+                  </a:txBody>
+                  <a:tcPr/>
+                </a:tc>
+                <a:tc>
+                  <a:txBody>
+                    <a:bodyPr/>
+                    <a:lstStyle/>
+                    <a:p>
+                      <a:r>
+                        <a:rPr lang="en-US" dirty="0" smtClean="0"/>
+                        <a:t>0.0772</a:t>
+                      </a:r>
+                      <a:endParaRPr lang="en-US" dirty="0"/>
+                    </a:p>
+                  </a:txBody>
+                  <a:tcPr/>
+                </a:tc>
+                <a:tc>
+                  <a:txBody>
+                    <a:bodyPr/>
+                    <a:lstStyle/>
+                    <a:p>
+                      <a:r>
+                        <a:rPr lang="en-US" dirty="0" smtClean="0"/>
+                        <a:t>0.5435</a:t>
+                      </a:r>
+                      <a:endParaRPr lang="en-US" dirty="0"/>
+                    </a:p>
+                  </a:txBody>
+                  <a:tcPr/>
+                </a:tc>
+                <a:tc>
+                  <a:txBody>
+                    <a:bodyPr/>
+                    <a:lstStyle/>
+                    <a:p>
+                      <a:r>
+                        <a:rPr lang="en-US" dirty="0" smtClean="0"/>
+                        <a:t>0.8060</a:t>
+                      </a:r>
+                      <a:endParaRPr lang="en-US" dirty="0"/>
+                    </a:p>
+                  </a:txBody>
+                  <a:tcPr/>
+                </a:tc>
+              </a:tr>
+              <a:tr h="370840">
+                <a:tc>
+                  <a:txBody>
+                    <a:bodyPr/>
+                    <a:lstStyle/>
+                    <a:p>
+                      <a:r>
+                        <a:rPr lang="en-US" dirty="0" smtClean="0"/>
+                        <a:t>W(“noise”)</a:t>
+                      </a:r>
+                      <a:endParaRPr lang="en-US" dirty="0"/>
+                    </a:p>
+                  </a:txBody>
+                  <a:tcPr/>
+                </a:tc>
+                <a:tc>
+                  <a:txBody>
+                    <a:bodyPr/>
+                    <a:lstStyle/>
+                    <a:p>
+                      <a:r>
+                        <a:rPr lang="en-US" dirty="0" smtClean="0"/>
+                        <a:t>10.0</a:t>
+                      </a:r>
+                      <a:endParaRPr lang="en-US" dirty="0"/>
+                    </a:p>
+                  </a:txBody>
+                  <a:tcPr/>
+                </a:tc>
+                <a:tc>
+                  <a:txBody>
+                    <a:bodyPr/>
+                    <a:lstStyle/>
+                    <a:p>
+                      <a:r>
+                        <a:rPr lang="en-US" dirty="0" smtClean="0"/>
+                        <a:t>1.3407</a:t>
+                      </a:r>
+                      <a:endParaRPr lang="en-US" dirty="0"/>
+                    </a:p>
+                  </a:txBody>
+                  <a:tcPr/>
+                </a:tc>
+                <a:tc>
+                  <a:txBody>
+                    <a:bodyPr/>
+                    <a:lstStyle/>
+                    <a:p>
+                      <a:r>
+                        <a:rPr lang="en-US" dirty="0" smtClean="0"/>
+                        <a:t>-0.0132</a:t>
+                      </a:r>
+                      <a:endParaRPr lang="en-US" dirty="0"/>
+                    </a:p>
+                  </a:txBody>
+                  <a:tcPr/>
+                </a:tc>
+              </a:tr>
+            </a:tbl>
+          </a:graphicData>
+        </a:graphic>
+      </p:graphicFrame>
+      <p:sp>
+        <p:nvSpPr>
+          <p:cNvPr id="5" name="Content Placeholder 2"/>
+          <p:cNvSpPr txBox="1">
+            <a:spLocks/>
+          </p:cNvSpPr>
+          <p:nvPr/>
+        </p:nvSpPr>
+        <p:spPr>
+          <a:xfrm>
+            <a:off x="457200" y="1600200"/>
+            <a:ext cx="7467600" cy="4525963"/>
+          </a:xfrm>
+          <a:prstGeom prst="rect">
+            <a:avLst/>
+          </a:prstGeom>
+        </p:spPr>
+        <p:txBody>
+          <a:bodyPr vert="horz">
+            <a:normAutofit/>
+          </a:bodyPr>
+          <a:lstStyle/>
+          <a:p>
+            <a:pPr marL="420624" marR="0" lvl="0" indent="-384048" algn="l" defTabSz="914400" rtl="0" eaLnBrk="1" fontAlgn="auto" latinLnBrk="0" hangingPunct="1">
+              <a:lnSpc>
+                <a:spcPct val="100000"/>
+              </a:lnSpc>
+              <a:spcBef>
+                <a:spcPct val="20000"/>
+              </a:spcBef>
+              <a:spcAft>
+                <a:spcPts val="0"/>
+              </a:spcAft>
+              <a:buClr>
+                <a:schemeClr val="accent1"/>
+              </a:buClr>
+              <a:buSzPct val="80000"/>
+              <a:buFont typeface="Wingdings 2"/>
+              <a:buChar char=""/>
+              <a:tabLst/>
+              <a:defRPr/>
+            </a:pPr>
+            <a:r>
+              <a:rPr kumimoji="0" lang="en-US" sz="3000" b="0" i="0" u="none" strike="noStrike" kern="1200" cap="none" spc="0" normalizeH="0" baseline="0" noProof="0" dirty="0" smtClean="0">
+                <a:ln>
+                  <a:noFill/>
+                </a:ln>
+                <a:solidFill>
+                  <a:schemeClr val="tx1"/>
+                </a:solidFill>
+                <a:effectLst/>
+                <a:uLnTx/>
+                <a:uFillTx/>
+                <a:latin typeface="+mn-lt"/>
+                <a:ea typeface="+mn-ea"/>
+                <a:cs typeface="+mn-cs"/>
+              </a:rPr>
+              <a:t>Start with already trained weights</a:t>
+            </a:r>
+            <a:r>
+              <a:rPr kumimoji="0" lang="en-US" sz="3000" b="0" i="0" u="none" strike="noStrike" kern="1200" cap="none" spc="0" normalizeH="0" noProof="0" dirty="0" smtClean="0">
+                <a:ln>
+                  <a:noFill/>
+                </a:ln>
+                <a:solidFill>
+                  <a:schemeClr val="tx1"/>
+                </a:solidFill>
+                <a:effectLst/>
+                <a:uLnTx/>
+                <a:uFillTx/>
+                <a:latin typeface="+mn-lt"/>
+                <a:ea typeface="+mn-ea"/>
+                <a:cs typeface="+mn-cs"/>
+              </a:rPr>
+              <a:t> for other features. Largest magnitude is &lt;10.</a:t>
+            </a:r>
+            <a:endParaRPr kumimoji="0" lang="en-US" sz="3000" b="0" i="0" u="none" strike="noStrike" kern="1200" cap="none" spc="0" normalizeH="0" baseline="0" noProof="0" dirty="0" smtClean="0">
+              <a:ln>
+                <a:noFill/>
+              </a:ln>
+              <a:solidFill>
+                <a:schemeClr val="tx1"/>
+              </a:solidFill>
+              <a:effectLst/>
+              <a:uLnTx/>
+              <a:uFillTx/>
+              <a:latin typeface="+mn-lt"/>
+              <a:ea typeface="+mn-ea"/>
+              <a:cs typeface="+mn-cs"/>
+            </a:endParaRPr>
+          </a:p>
+          <a:p>
+            <a:pPr marL="420624" marR="0" lvl="0" indent="-384048" algn="l" defTabSz="914400" rtl="0" eaLnBrk="1" fontAlgn="auto" latinLnBrk="0" hangingPunct="1">
+              <a:lnSpc>
+                <a:spcPct val="100000"/>
+              </a:lnSpc>
+              <a:spcBef>
+                <a:spcPct val="20000"/>
+              </a:spcBef>
+              <a:spcAft>
+                <a:spcPts val="0"/>
+              </a:spcAft>
+              <a:buClr>
+                <a:schemeClr val="accent1"/>
+              </a:buClr>
+              <a:buSzPct val="80000"/>
+              <a:buFont typeface="Wingdings 2"/>
+              <a:buChar char=""/>
+              <a:tabLst/>
+              <a:defRPr/>
+            </a:pPr>
+            <a:r>
+              <a:rPr kumimoji="0" lang="en-US" sz="3000" b="0" i="0" u="none" strike="noStrike" kern="1200" cap="none" spc="0" normalizeH="0" baseline="0" noProof="0" dirty="0" smtClean="0">
+                <a:ln>
+                  <a:noFill/>
+                </a:ln>
+                <a:solidFill>
+                  <a:schemeClr val="tx1"/>
+                </a:solidFill>
+                <a:effectLst/>
+                <a:uLnTx/>
+                <a:uFillTx/>
+                <a:latin typeface="+mn-lt"/>
+                <a:ea typeface="+mn-ea"/>
+                <a:cs typeface="+mn-cs"/>
+              </a:rPr>
+              <a:t>Inject 1 noise feature, picking</a:t>
+            </a:r>
+            <a:r>
+              <a:rPr kumimoji="0" lang="en-US" sz="3000" b="0" i="0" u="none" strike="noStrike" kern="1200" cap="none" spc="0" normalizeH="0" noProof="0" dirty="0" smtClean="0">
+                <a:ln>
+                  <a:noFill/>
+                </a:ln>
+                <a:solidFill>
+                  <a:schemeClr val="tx1"/>
+                </a:solidFill>
+                <a:effectLst/>
+                <a:uLnTx/>
+                <a:uFillTx/>
+                <a:latin typeface="+mn-lt"/>
+                <a:ea typeface="+mn-ea"/>
+                <a:cs typeface="+mn-cs"/>
+              </a:rPr>
+              <a:t> U[0,1]. Init it’s weights by 10. </a:t>
+            </a:r>
+            <a:endParaRPr kumimoji="0" lang="en-US" sz="3000" b="0" i="0" u="none" strike="noStrike" kern="1200" cap="none" spc="0" normalizeH="0" baseline="0" noProof="0" dirty="0">
+              <a:ln>
+                <a:noFill/>
+              </a:ln>
+              <a:solidFill>
+                <a:schemeClr val="tx1"/>
+              </a:solidFill>
+              <a:effectLst/>
+              <a:uLnTx/>
+              <a:uFillTx/>
+              <a:latin typeface="+mn-lt"/>
+              <a:ea typeface="+mn-ea"/>
+              <a:cs typeface="+mn-cs"/>
+            </a:endParaRPr>
           </a:p>
         </p:txBody>
       </p:sp>
       <p:sp>
         <p:nvSpPr>
-          <p:cNvPr id="3" name="Content Placeholder 2"/>
-          <p:cNvSpPr>
-            <a:spLocks noGrp="1"/>
-          </p:cNvSpPr>
-          <p:nvPr>
-            <p:ph idx="1"/>
-          </p:nvPr>
+          <p:cNvPr id="6" name="TextBox 5"/>
+          <p:cNvSpPr txBox="1"/>
+          <p:nvPr/>
         </p:nvSpPr>
-        <p:spPr/>
+        <p:spPr>
+          <a:xfrm>
+            <a:off x="0" y="0"/>
+            <a:ext cx="1219200" cy="261610"/>
+          </a:xfrm>
+          <a:prstGeom prst="rect">
+            <a:avLst/>
+          </a:prstGeom>
+          <a:noFill/>
+        </p:spPr>
         <p:txBody>
-          <a:bodyPr/>
+          <a:bodyPr wrap="square" rtlCol="0">
+            <a:spAutoFit/>
+          </a:bodyPr>
           <a:lstStyle/>
           <a:p>
             <a:r>
-              <a:rPr lang="en-US" dirty="0" err="1" smtClean="0"/>
-              <a:t>RESTful</a:t>
+              <a:rPr lang="en-US" sz="1100" dirty="0" smtClean="0"/>
+              <a:t>Backup slides</a:t>
             </a:r>
-            <a:r>
-              <a:rPr lang="en-US" dirty="0" smtClean="0"/>
-              <a:t> interface for all components </a:t>
-            </a:r>
-          </a:p>
-          <a:p>
-            <a:pPr lvl="1"/>
-            <a:r>
-              <a:rPr lang="en-US" dirty="0" smtClean="0"/>
-              <a:t>e.g. one can outsource computationally intensive training to other servers</a:t>
-            </a:r>
-          </a:p>
-          <a:p>
-            <a:r>
-              <a:rPr lang="en-US" dirty="0" err="1" smtClean="0"/>
-              <a:t>SNSRouter</a:t>
-            </a:r>
-            <a:r>
-              <a:rPr lang="en-US" dirty="0" smtClean="0"/>
-              <a:t> as a platform</a:t>
-            </a:r>
-          </a:p>
-          <a:p>
-            <a:pPr lvl="1"/>
-            <a:r>
-              <a:rPr lang="en-US" dirty="0" smtClean="0"/>
-              <a:t>e.g. can be used to aggregate multiple channels</a:t>
-            </a:r>
-          </a:p>
-          <a:p>
-            <a:endParaRPr lang="en-US" dirty="0" smtClean="0"/>
-          </a:p>
-          <a:p>
-            <a:endParaRPr lang="en-US" dirty="0"/>
+            <a:endParaRPr lang="en-US" sz="1100" dirty="0"/>
           </a:p>
         </p:txBody>
       </p:sp>
@@ -17158,9 +18027,210 @@
   <p:timing>
     <p:tnLst>
       <p:par>
-        <p:cTn id="1" dur="indefinite" restart="never" nodeType="tmRoot"/>
+        <p:cTn id="1" dur="indefinite" restart="never" nodeType="tmRoot">
+          <p:childTnLst>
+            <p:seq concurrent="1" nextAc="seek">
+              <p:cTn id="2" dur="indefinite" nodeType="mainSeq">
+                <p:childTnLst>
+                  <p:par>
+                    <p:cTn id="3" fill="hold">
+                      <p:stCondLst>
+                        <p:cond delay="indefinite"/>
+                      </p:stCondLst>
+                      <p:childTnLst>
+                        <p:par>
+                          <p:cTn id="4" fill="hold">
+                            <p:stCondLst>
+                              <p:cond delay="0"/>
+                            </p:stCondLst>
+                            <p:childTnLst>
+                              <p:par>
+                                <p:cTn id="5" presetID="22" presetClass="entr" presetSubtype="1" fill="hold" grpId="0" nodeType="clickEffect">
+                                  <p:stCondLst>
+                                    <p:cond delay="0"/>
+                                  </p:stCondLst>
+                                  <p:childTnLst>
+                                    <p:set>
+                                      <p:cBhvr>
+                                        <p:cTn id="6" dur="1" fill="hold">
+                                          <p:stCondLst>
+                                            <p:cond delay="0"/>
+                                          </p:stCondLst>
+                                        </p:cTn>
+                                        <p:tgtEl>
+                                          <p:spTgt spid="5">
+                                            <p:txEl>
+                                              <p:pRg st="0" end="0"/>
+                                            </p:txEl>
+                                          </p:spTgt>
+                                        </p:tgtEl>
+                                        <p:attrNameLst>
+                                          <p:attrName>style.visibility</p:attrName>
+                                        </p:attrNameLst>
+                                      </p:cBhvr>
+                                      <p:to>
+                                        <p:strVal val="visible"/>
+                                      </p:to>
+                                    </p:set>
+                                    <p:animEffect transition="in" filter="wipe(up)">
+                                      <p:cBhvr>
+                                        <p:cTn id="7" dur="500"/>
+                                        <p:tgtEl>
+                                          <p:spTgt spid="5">
+                                            <p:txEl>
+                                              <p:pRg st="0" end="0"/>
+                                            </p:txEl>
+                                          </p:spTgt>
+                                        </p:tgtEl>
+                                      </p:cBhvr>
+                                    </p:animEffect>
+                                  </p:childTnLst>
+                                </p:cTn>
+                              </p:par>
+                            </p:childTnLst>
+                          </p:cTn>
+                        </p:par>
+                      </p:childTnLst>
+                    </p:cTn>
+                  </p:par>
+                  <p:par>
+                    <p:cTn id="8" fill="hold">
+                      <p:stCondLst>
+                        <p:cond delay="indefinite"/>
+                      </p:stCondLst>
+                      <p:childTnLst>
+                        <p:par>
+                          <p:cTn id="9" fill="hold">
+                            <p:stCondLst>
+                              <p:cond delay="0"/>
+                            </p:stCondLst>
+                            <p:childTnLst>
+                              <p:par>
+                                <p:cTn id="10" presetID="22" presetClass="entr" presetSubtype="1" fill="hold" grpId="0" nodeType="clickEffect">
+                                  <p:stCondLst>
+                                    <p:cond delay="0"/>
+                                  </p:stCondLst>
+                                  <p:childTnLst>
+                                    <p:set>
+                                      <p:cBhvr>
+                                        <p:cTn id="11" dur="1" fill="hold">
+                                          <p:stCondLst>
+                                            <p:cond delay="0"/>
+                                          </p:stCondLst>
+                                        </p:cTn>
+                                        <p:tgtEl>
+                                          <p:spTgt spid="5">
+                                            <p:txEl>
+                                              <p:pRg st="1" end="1"/>
+                                            </p:txEl>
+                                          </p:spTgt>
+                                        </p:tgtEl>
+                                        <p:attrNameLst>
+                                          <p:attrName>style.visibility</p:attrName>
+                                        </p:attrNameLst>
+                                      </p:cBhvr>
+                                      <p:to>
+                                        <p:strVal val="visible"/>
+                                      </p:to>
+                                    </p:set>
+                                    <p:animEffect transition="in" filter="wipe(up)">
+                                      <p:cBhvr>
+                                        <p:cTn id="12" dur="500"/>
+                                        <p:tgtEl>
+                                          <p:spTgt spid="5">
+                                            <p:txEl>
+                                              <p:pRg st="1" end="1"/>
+                                            </p:txEl>
+                                          </p:spTgt>
+                                        </p:tgtEl>
+                                      </p:cBhvr>
+                                    </p:animEffect>
+                                  </p:childTnLst>
+                                </p:cTn>
+                              </p:par>
+                            </p:childTnLst>
+                          </p:cTn>
+                        </p:par>
+                      </p:childTnLst>
+                    </p:cTn>
+                  </p:par>
+                  <p:par>
+                    <p:cTn id="13" fill="hold">
+                      <p:stCondLst>
+                        <p:cond delay="indefinite"/>
+                      </p:stCondLst>
+                      <p:childTnLst>
+                        <p:par>
+                          <p:cTn id="14" fill="hold">
+                            <p:stCondLst>
+                              <p:cond delay="0"/>
+                            </p:stCondLst>
+                            <p:childTnLst>
+                              <p:par>
+                                <p:cTn id="15" presetID="22" presetClass="entr" presetSubtype="1" fill="hold" nodeType="clickEffect">
+                                  <p:stCondLst>
+                                    <p:cond delay="0"/>
+                                  </p:stCondLst>
+                                  <p:childTnLst>
+                                    <p:set>
+                                      <p:cBhvr>
+                                        <p:cTn id="16" dur="1" fill="hold">
+                                          <p:stCondLst>
+                                            <p:cond delay="0"/>
+                                          </p:stCondLst>
+                                        </p:cTn>
+                                        <p:tgtEl>
+                                          <p:spTgt spid="4"/>
+                                        </p:tgtEl>
+                                        <p:attrNameLst>
+                                          <p:attrName>style.visibility</p:attrName>
+                                        </p:attrNameLst>
+                                      </p:cBhvr>
+                                      <p:to>
+                                        <p:strVal val="visible"/>
+                                      </p:to>
+                                    </p:set>
+                                    <p:animEffect transition="in" filter="wipe(up)">
+                                      <p:cBhvr>
+                                        <p:cTn id="17" dur="500"/>
+                                        <p:tgtEl>
+                                          <p:spTgt spid="4"/>
+                                        </p:tgtEl>
+                                      </p:cBhvr>
+                                    </p:animEffect>
+                                  </p:childTnLst>
+                                </p:cTn>
+                              </p:par>
+                            </p:childTnLst>
+                          </p:cTn>
+                        </p:par>
+                      </p:childTnLst>
+                    </p:cTn>
+                  </p:par>
+                </p:childTnLst>
+              </p:cTn>
+              <p:prevCondLst>
+                <p:cond evt="onPrev" delay="0">
+                  <p:tgtEl>
+                    <p:sldTgt/>
+                  </p:tgtEl>
+                </p:cond>
+              </p:prevCondLst>
+              <p:nextCondLst>
+                <p:cond evt="onNext" delay="0">
+                  <p:tgtEl>
+                    <p:sldTgt/>
+                  </p:tgtEl>
+                </p:cond>
+              </p:nextCondLst>
+            </p:seq>
+          </p:childTnLst>
+        </p:cTn>
       </p:par>
     </p:tnLst>
+    <p:bldLst>
+      <p:bldP spid="5" grpId="0" build="p"/>
+    </p:bldLst>
   </p:timing>
 </p:sld>
 </file>
@@ -17199,7 +18269,7 @@
           <a:p>
             <a:r>
               <a:rPr lang="en-US" dirty="0" smtClean="0"/>
-              <a:t>Future Works -- Algorithm</a:t>
+              <a:t>Future Works -- System</a:t>
             </a:r>
             <a:endParaRPr lang="en-US" dirty="0"/>
           </a:p>
@@ -17221,41 +18291,73 @@
           <a:lstStyle/>
           <a:p>
             <a:r>
-              <a:rPr lang="en-US" dirty="0" smtClean="0"/>
-              <a:t>Add regularization to alleviate </a:t>
+              <a:rPr lang="en-US" dirty="0" err="1" smtClean="0"/>
+              <a:t>RESTful</a:t>
             </a:r>
             <a:r>
-              <a:rPr lang="en-US" dirty="0" err="1" smtClean="0"/>
-              <a:t>overfiting</a:t>
-            </a:r>
-            <a:endParaRPr lang="en-US" dirty="0" smtClean="0"/>
-          </a:p>
-          <a:p>
-            <a:r>
               <a:rPr lang="en-US" dirty="0" smtClean="0"/>
-              <a:t>Advanced feature extraction.</a:t>
-            </a:r>
-          </a:p>
-          <a:p>
-            <a:r>
-              <a:rPr lang="en-US" dirty="0" smtClean="0"/>
-              <a:t>SGD can do online training.</a:t>
+              <a:t> interface for all components </a:t>
             </a:r>
           </a:p>
           <a:p>
             <a:pPr lvl="1"/>
             <a:r>
               <a:rPr lang="en-US" dirty="0" smtClean="0"/>
-              <a:t>e.g. one sample in, derive some pairs, do SGD on those pairs. </a:t>
+              <a:t>e.g. one can outsource computationally intensive training to other servers</a:t>
+            </a:r>
+          </a:p>
+          <a:p>
+            <a:r>
+              <a:rPr lang="en-US" dirty="0" err="1" smtClean="0"/>
+              <a:t>SNSRouter</a:t>
+            </a:r>
+            <a:r>
+              <a:rPr lang="en-US" dirty="0" smtClean="0"/>
+              <a:t> as a platform</a:t>
             </a:r>
           </a:p>
           <a:p>
             <a:pPr lvl="1"/>
             <a:r>
               <a:rPr lang="en-US" dirty="0" smtClean="0"/>
-              <a:t>Naturally time sliding.   </a:t>
+              <a:t>e.g. can be used to aggregate multiple channels</a:t>
             </a:r>
+          </a:p>
+          <a:p>
+            <a:endParaRPr lang="en-US" dirty="0" smtClean="0"/>
+          </a:p>
+          <a:p>
             <a:endParaRPr lang="en-US" dirty="0"/>
+          </a:p>
+        </p:txBody>
+      </p:sp>
+      <p:sp>
+        <p:nvSpPr>
+          <p:cNvPr id="4" name="TextBox 3"/>
+          <p:cNvSpPr txBox="1"/>
+          <p:nvPr/>
+        </p:nvSpPr>
+        <p:spPr>
+          <a:xfrm>
+            <a:off x="0" y="0"/>
+            <a:ext cx="1219200" cy="261610"/>
+          </a:xfrm>
+          <a:prstGeom prst="rect">
+            <a:avLst/>
+          </a:prstGeom>
+          <a:noFill/>
+        </p:spPr>
+        <p:txBody>
+          <a:bodyPr wrap="square" rtlCol="0">
+            <a:spAutoFit/>
+          </a:bodyPr>
+          <a:lstStyle/>
+          <a:p>
+            <a:r>
+              <a:rPr lang="en-US" sz="1100" dirty="0" smtClean="0"/>
+              <a:t>Backup slides</a:t>
+            </a:r>
+            <a:endParaRPr lang="en-US" sz="1100" dirty="0"/>
           </a:p>
         </p:txBody>
       </p:sp>
@@ -17275,6 +18377,145 @@
 </file>
 
 <file path=ppt/slides/slide26.xml><?xml version="1.0" encoding="utf-8"?>
+<p:sld xmlns:a="http://schemas.openxmlformats.org/drawingml/2006/main" xmlns:r="http://schemas.openxmlformats.org/officeDocument/2006/relationships" xmlns:p="http://schemas.openxmlformats.org/presentationml/2006/main">
+  <p:cSld>
+    <p:spTree>
+      <p:nvGrpSpPr>
+        <p:cNvPr id="1" name=""/>
+        <p:cNvGrpSpPr/>
+        <p:nvPr/>
+      </p:nvGrpSpPr>
+      <p:grpSpPr>
+        <a:xfrm>
+          <a:off x="0" y="0"/>
+          <a:ext cx="0" cy="0"/>
+          <a:chOff x="0" y="0"/>
+          <a:chExt cx="0" cy="0"/>
+        </a:xfrm>
+      </p:grpSpPr>
+      <p:sp>
+        <p:nvSpPr>
+          <p:cNvPr id="2" name="Title 1"/>
+          <p:cNvSpPr>
+            <a:spLocks noGrp="1"/>
+          </p:cNvSpPr>
+          <p:nvPr>
+            <p:ph type="title"/>
+          </p:nvPr>
+        </p:nvSpPr>
+        <p:spPr/>
+        <p:txBody>
+          <a:bodyPr/>
+          <a:lstStyle/>
+          <a:p>
+            <a:r>
+              <a:rPr lang="en-US" dirty="0" smtClean="0"/>
+              <a:t>Future Works -- Algorithm</a:t>
+            </a:r>
+            <a:endParaRPr lang="en-US" dirty="0"/>
+          </a:p>
+        </p:txBody>
+      </p:sp>
+      <p:sp>
+        <p:nvSpPr>
+          <p:cNvPr id="3" name="Content Placeholder 2"/>
+          <p:cNvSpPr>
+            <a:spLocks noGrp="1"/>
+          </p:cNvSpPr>
+          <p:nvPr>
+            <p:ph idx="1"/>
+          </p:nvPr>
+        </p:nvSpPr>
+        <p:spPr/>
+        <p:txBody>
+          <a:bodyPr/>
+          <a:lstStyle/>
+          <a:p>
+            <a:r>
+              <a:rPr lang="en-US" dirty="0" smtClean="0"/>
+              <a:t>Add regularization to alleviate </a:t>
+            </a:r>
+            <a:r>
+              <a:rPr lang="en-US" dirty="0" err="1" smtClean="0"/>
+              <a:t>overfiting</a:t>
+            </a:r>
+            <a:endParaRPr lang="en-US" dirty="0" smtClean="0"/>
+          </a:p>
+          <a:p>
+            <a:r>
+              <a:rPr lang="en-US" dirty="0" smtClean="0"/>
+              <a:t>Advanced feature extraction.</a:t>
+            </a:r>
+          </a:p>
+          <a:p>
+            <a:r>
+              <a:rPr lang="en-US" dirty="0" smtClean="0"/>
+              <a:t>SGD can do online training.</a:t>
+            </a:r>
+          </a:p>
+          <a:p>
+            <a:pPr lvl="1"/>
+            <a:r>
+              <a:rPr lang="en-US" dirty="0" smtClean="0"/>
+              <a:t>e.g. one sample in, derive some pairs, do SGD on those pairs. </a:t>
+            </a:r>
+          </a:p>
+          <a:p>
+            <a:pPr lvl="1"/>
+            <a:r>
+              <a:rPr lang="en-US" dirty="0" smtClean="0"/>
+              <a:t>Naturally time sliding.   </a:t>
+            </a:r>
+            <a:endParaRPr lang="en-US" dirty="0"/>
+          </a:p>
+        </p:txBody>
+      </p:sp>
+      <p:sp>
+        <p:nvSpPr>
+          <p:cNvPr id="4" name="TextBox 3"/>
+          <p:cNvSpPr txBox="1"/>
+          <p:nvPr/>
+        </p:nvSpPr>
+        <p:spPr>
+          <a:xfrm>
+            <a:off x="0" y="0"/>
+            <a:ext cx="1219200" cy="261610"/>
+          </a:xfrm>
+          <a:prstGeom prst="rect">
+            <a:avLst/>
+          </a:prstGeom>
+          <a:noFill/>
+        </p:spPr>
+        <p:txBody>
+          <a:bodyPr wrap="square" rtlCol="0">
+            <a:spAutoFit/>
+          </a:bodyPr>
+          <a:lstStyle/>
+          <a:p>
+            <a:r>
+              <a:rPr lang="en-US" sz="1100" dirty="0" smtClean="0"/>
+              <a:t>Backup slides</a:t>
+            </a:r>
+            <a:endParaRPr lang="en-US" sz="1100" dirty="0"/>
+          </a:p>
+        </p:txBody>
+      </p:sp>
+    </p:spTree>
+  </p:cSld>
+  <p:clrMapOvr>
+    <a:masterClrMapping/>
+  </p:clrMapOvr>
+  <p:timing>
+    <p:tnLst>
+      <p:par>
+        <p:cTn id="1" dur="indefinite" restart="never" nodeType="tmRoot"/>
+      </p:par>
+    </p:tnLst>
+  </p:timing>
+</p:sld>
+</file>
+
+<file path=ppt/slides/slide27.xml><?xml version="1.0" encoding="utf-8"?>
 <p:sld xmlns:a="http://schemas.openxmlformats.org/drawingml/2006/main" xmlns:r="http://schemas.openxmlformats.org/officeDocument/2006/relationships" xmlns:p="http://schemas.openxmlformats.org/presentationml/2006/main">
   <p:cSld>
     <p:spTree>
@@ -17499,6 +18740,36 @@
               <a:t> &gt; 0.001621</a:t>
             </a:r>
             <a:endParaRPr lang="en-US" dirty="0"/>
+          </a:p>
+        </p:txBody>
+      </p:sp>
+      <p:sp>
+        <p:nvSpPr>
+          <p:cNvPr id="6" name="TextBox 5"/>
+          <p:cNvSpPr txBox="1"/>
+          <p:nvPr/>
+        </p:nvSpPr>
+        <p:spPr>
+          <a:xfrm>
+            <a:off x="0" y="0"/>
+            <a:ext cx="1219200" cy="261610"/>
+          </a:xfrm>
+          <a:prstGeom prst="rect">
+            <a:avLst/>
+          </a:prstGeom>
+          <a:noFill/>
+        </p:spPr>
+        <p:txBody>
+          <a:bodyPr wrap="square" rtlCol="0">
+            <a:spAutoFit/>
+          </a:bodyPr>
+          <a:lstStyle/>
+          <a:p>
+            <a:r>
+              <a:rPr lang="en-US" sz="1100" dirty="0" smtClean="0"/>
+              <a:t>Backup slides</a:t>
+            </a:r>
+            <a:endParaRPr lang="en-US" sz="1100" dirty="0"/>
           </a:p>
         </p:txBody>
       </p:sp>
@@ -18739,7 +20010,7 @@
                             </p:stCondLst>
                             <p:childTnLst>
                               <p:par>
-                                <p:cTn id="5" presetID="4" presetClass="entr" presetSubtype="16" fill="hold" grpId="0" nodeType="clickEffect">
+                                <p:cTn id="5" presetID="22" presetClass="entr" presetSubtype="8" fill="hold" grpId="0" nodeType="clickEffect">
                                   <p:stCondLst>
                                     <p:cond delay="0"/>
                                   </p:stCondLst>
@@ -18766,7 +20037,7 @@
                                         <p:strVal val="visible"/>
                                       </p:to>
                                     </p:set>
-                                    <p:animEffect transition="in" filter="box(in)">
+                                    <p:animEffect transition="in" filter="wipe(left)">
                                       <p:cBhvr>
                                         <p:cTn id="7" dur="500"/>
                                         <p:tgtEl>
@@ -18800,7 +20071,7 @@
                             </p:stCondLst>
                             <p:childTnLst>
                               <p:par>
-                                <p:cTn id="10" presetID="4" presetClass="entr" presetSubtype="16" fill="hold" grpId="0" nodeType="clickEffect">
+                                <p:cTn id="10" presetID="22" presetClass="entr" presetSubtype="8" fill="hold" grpId="0" nodeType="clickEffect">
                                   <p:stCondLst>
                                     <p:cond delay="0"/>
                                   </p:stCondLst>
@@ -18827,7 +20098,7 @@
                                         <p:strVal val="visible"/>
                                       </p:to>
                                     </p:set>
-                                    <p:animEffect transition="in" filter="box(in)">
+                                    <p:animEffect transition="in" filter="wipe(left)">
                                       <p:cBhvr>
                                         <p:cTn id="12" dur="500"/>
                                         <p:tgtEl>
@@ -18861,7 +20132,7 @@
                             </p:stCondLst>
                             <p:childTnLst>
                               <p:par>
-                                <p:cTn id="15" presetID="2" presetClass="entr" presetSubtype="8" fill="hold" nodeType="clickEffect">
+                                <p:cTn id="15" presetID="22" presetClass="entr" presetSubtype="8" fill="hold" nodeType="clickEffect">
                                   <p:stCondLst>
                                     <p:cond delay="0"/>
                                   </p:stCondLst>
@@ -18884,64 +20155,26 @@
                                         <p:strVal val="visible"/>
                                       </p:to>
                                     </p:set>
-                                    <p:anim calcmode="lin" valueType="num">
-                                      <p:cBhvr additive="base">
-                                        <p:cTn id="17" dur="500" fill="hold"/>
+                                    <p:animEffect transition="in" filter="wipe(left)">
+                                      <p:cBhvr>
+                                        <p:cTn id="17" dur="500"/>
                                         <p:tgtEl>
                                           <p:spTgt spid="19"/>
                                         </p:tgtEl>
-                                        <p:attrNameLst>
-                                          <p:attrName>ppt_x</p:attrName>
-                                        </p:attrNameLst>
-                                      </p:cBhvr>
-                                      <p:tavLst>
-                                        <p:tav tm="0">
-                                          <p:val>
-                                            <p:strVal val="0-#ppt_w/2"/>
-                                          </p:val>
-                                        </p:tav>
-                                        <p:tav tm="100000">
-                                          <p:val>
-                                            <p:strVal val="#ppt_x"/>
-                                          </p:val>
-                                        </p:tav>
-                                      </p:tavLst>
-                                    </p:anim>
-                                    <p:anim calcmode="lin" valueType="num">
-                                      <p:cBhvr additive="base">
-                                        <p:cTn id="18" dur="500" fill="hold"/>
-                                        <p:tgtEl>
-                                          <p:spTgt spid="19"/>
-                                        </p:tgtEl>
-                                        <p:attrNameLst>
-                                          <p:attrName>ppt_y</p:attrName>
-                                        </p:attrNameLst>
-                                      </p:cBhvr>
-                                      <p:tavLst>
-                                        <p:tav tm="0">
-                                          <p:val>
-                                            <p:strVal val="#ppt_y"/>
-                                          </p:val>
-                                        </p:tav>
-                                        <p:tav tm="100000">
-                                          <p:val>
-                                            <p:strVal val="#ppt_y"/>
-                                          </p:val>
-                                        </p:tav>
-                                      </p:tavLst>
-                                    </p:anim>
+                                      </p:cBhvr>
+                                    </p:animEffect>
                                   </p:childTnLst>
                                 </p:cTn>
                               </p:par>
                               <p:par>
-                                <p:cTn id="19" presetID="2" presetClass="entr" presetSubtype="8" fill="hold" nodeType="withEffect">
+                                <p:cTn id="18" presetID="22" presetClass="entr" presetSubtype="8" fill="hold" nodeType="withEffect">
                                   <p:stCondLst>
                                     <p:cond delay="0"/>
                                   </p:stCondLst>
                                   <p:childTnLst>
                                     <p:set>
                                       <p:cBhvr>
-                                        <p:cTn id="20" dur="1" fill="hold">
+                                        <p:cTn id="19" dur="1" fill="hold">
                                           <p:stCondLst>
                                             <p:cond delay="0"/>
                                           </p:stCondLst>
@@ -18957,64 +20190,26 @@
                                         <p:strVal val="visible"/>
                                       </p:to>
                                     </p:set>
-                                    <p:anim calcmode="lin" valueType="num">
-                                      <p:cBhvr additive="base">
-                                        <p:cTn id="21" dur="500" fill="hold"/>
+                                    <p:animEffect transition="in" filter="wipe(left)">
+                                      <p:cBhvr>
+                                        <p:cTn id="20" dur="500"/>
                                         <p:tgtEl>
                                           <p:spTgt spid="41"/>
                                         </p:tgtEl>
-                                        <p:attrNameLst>
-                                          <p:attrName>ppt_x</p:attrName>
-                                        </p:attrNameLst>
-                                      </p:cBhvr>
-                                      <p:tavLst>
-                                        <p:tav tm="0">
-                                          <p:val>
-                                            <p:strVal val="0-#ppt_w/2"/>
-                                          </p:val>
-                                        </p:tav>
-                                        <p:tav tm="100000">
-                                          <p:val>
-                                            <p:strVal val="#ppt_x"/>
-                                          </p:val>
-                                        </p:tav>
-                                      </p:tavLst>
-                                    </p:anim>
-                                    <p:anim calcmode="lin" valueType="num">
-                                      <p:cBhvr additive="base">
-                                        <p:cTn id="22" dur="500" fill="hold"/>
-                                        <p:tgtEl>
-                                          <p:spTgt spid="41"/>
-                                        </p:tgtEl>
-                                        <p:attrNameLst>
-                                          <p:attrName>ppt_y</p:attrName>
-                                        </p:attrNameLst>
-                                      </p:cBhvr>
-                                      <p:tavLst>
-                                        <p:tav tm="0">
-                                          <p:val>
-                                            <p:strVal val="#ppt_y"/>
-                                          </p:val>
-                                        </p:tav>
-                                        <p:tav tm="100000">
-                                          <p:val>
-                                            <p:strVal val="#ppt_y"/>
-                                          </p:val>
-                                        </p:tav>
-                                      </p:tavLst>
-                                    </p:anim>
+                                      </p:cBhvr>
+                                    </p:animEffect>
                                   </p:childTnLst>
                                 </p:cTn>
                               </p:par>
                               <p:par>
-                                <p:cTn id="23" presetID="2" presetClass="entr" presetSubtype="8" fill="hold" nodeType="withEffect">
+                                <p:cTn id="21" presetID="22" presetClass="entr" presetSubtype="8" fill="hold" nodeType="withEffect">
                                   <p:stCondLst>
                                     <p:cond delay="0"/>
                                   </p:stCondLst>
                                   <p:childTnLst>
                                     <p:set>
                                       <p:cBhvr>
-                                        <p:cTn id="24" dur="1" fill="hold">
+                                        <p:cTn id="22" dur="1" fill="hold">
                                           <p:stCondLst>
                                             <p:cond delay="0"/>
                                           </p:stCondLst>
@@ -19030,70 +20225,67 @@
                                         <p:strVal val="visible"/>
                                       </p:to>
                                     </p:set>
-                                    <p:anim calcmode="lin" valueType="num">
-                                      <p:cBhvr additive="base">
-                                        <p:cTn id="25" dur="500" fill="hold"/>
+                                    <p:animEffect transition="in" filter="wipe(left)">
+                                      <p:cBhvr>
+                                        <p:cTn id="23" dur="500"/>
                                         <p:tgtEl>
                                           <p:spTgt spid="40"/>
                                         </p:tgtEl>
-                                        <p:attrNameLst>
-                                          <p:attrName>ppt_x</p:attrName>
-                                        </p:attrNameLst>
-                                      </p:cBhvr>
-                                      <p:tavLst>
-                                        <p:tav tm="0">
-                                          <p:val>
-                                            <p:strVal val="0-#ppt_w/2"/>
-                                          </p:val>
-                                        </p:tav>
-                                        <p:tav tm="100000">
-                                          <p:val>
-                                            <p:strVal val="#ppt_x"/>
-                                          </p:val>
-                                        </p:tav>
-                                      </p:tavLst>
-                                    </p:anim>
-                                    <p:anim calcmode="lin" valueType="num">
-                                      <p:cBhvr additive="base">
-                                        <p:cTn id="26" dur="500" fill="hold"/>
-                                        <p:tgtEl>
-                                          <p:spTgt spid="40"/>
-                                        </p:tgtEl>
-                                        <p:attrNameLst>
-                                          <p:attrName>ppt_y</p:attrName>
-                                        </p:attrNameLst>
-                                      </p:cBhvr>
-                                      <p:tavLst>
-                                        <p:tav tm="0">
-                                          <p:val>
-                                            <p:strVal val="#ppt_y"/>
-                                          </p:val>
-                                        </p:tav>
-                                        <p:tav tm="100000">
-                                          <p:val>
-                                            <p:strVal val="#ppt_y"/>
-                                          </p:val>
-                                        </p:tav>
-                                      </p:tavLst>
-                                    </p:anim>
+                                      </p:cBhvr>
+                                    </p:animEffect>
                                   </p:childTnLst>
                                 </p:cTn>
                               </p:par>
                               <p:par>
-                                <p:cTn id="27" presetID="2" presetClass="entr" presetSubtype="8" fill="hold" nodeType="withEffect">
+                                <p:cTn id="24" presetID="22" presetClass="entr" presetSubtype="8" fill="hold" nodeType="withEffect">
                                   <p:stCondLst>
                                     <p:cond delay="0"/>
                                   </p:stCondLst>
                                   <p:childTnLst>
                                     <p:set>
                                       <p:cBhvr>
+                                        <p:cTn id="25" dur="1" fill="hold">
+                                          <p:stCondLst>
+                                            <p:cond delay="0"/>
+                                          </p:stCondLst>
+                                        </p:cTn>
+                                        <p:tgtEl>
+                                          <p:spTgt spid="39"/>
+                                        </p:tgtEl>
+                                        <p:attrNameLst>
+                                          <p:attrName>style.visibility</p:attrName>
+                                        </p:attrNameLst>
+                                      </p:cBhvr>
+                                      <p:to>
+                                        <p:strVal val="visible"/>
+                                      </p:to>
+                                    </p:set>
+                                    <p:animEffect transition="in" filter="wipe(left)">
+                                      <p:cBhvr>
+                                        <p:cTn id="26" dur="500"/>
+                                        <p:tgtEl>
+                                          <p:spTgt spid="39"/>
+                                        </p:tgtEl>
+                                      </p:cBhvr>
+                                    </p:animEffect>
+                                  </p:childTnLst>
+                                </p:cTn>
+                              </p:par>
+                              <p:par>
+                                <p:cTn id="27" presetID="22" presetClass="entr" presetSubtype="8" fill="hold" nodeType="withEffect">
+                                  <p:stCondLst>
+                                    <p:cond delay="0"/>
+                                  </p:stCondLst>
+                                  <p:childTnLst>
+                                    <p:set>
+                                      <p:cBhvr>
                                         <p:cTn id="28" dur="1" fill="hold">
                                           <p:stCondLst>
                                             <p:cond delay="0"/>
                                           </p:stCondLst>
                                         </p:cTn>
                                         <p:tgtEl>
-                                          <p:spTgt spid="39"/>
+                                          <p:spTgt spid="38"/>
                                         </p:tgtEl>
                                         <p:attrNameLst>
                                           <p:attrName>style.visibility</p:attrName>
@@ -19103,70 +20295,32 @@
                                         <p:strVal val="visible"/>
                                       </p:to>
                                     </p:set>
-                                    <p:anim calcmode="lin" valueType="num">
-                                      <p:cBhvr additive="base">
-                                        <p:cTn id="29" dur="500" fill="hold"/>
-                                        <p:tgtEl>
-                                          <p:spTgt spid="39"/>
-                                        </p:tgtEl>
-                                        <p:attrNameLst>
-                                          <p:attrName>ppt_x</p:attrName>
-                                        </p:attrNameLst>
-                                      </p:cBhvr>
-                                      <p:tavLst>
-                                        <p:tav tm="0">
-                                          <p:val>
-                                            <p:strVal val="0-#ppt_w/2"/>
-                                          </p:val>
-                                        </p:tav>
-                                        <p:tav tm="100000">
-                                          <p:val>
-                                            <p:strVal val="#ppt_x"/>
-                                          </p:val>
-                                        </p:tav>
-                                      </p:tavLst>
-                                    </p:anim>
-                                    <p:anim calcmode="lin" valueType="num">
-                                      <p:cBhvr additive="base">
-                                        <p:cTn id="30" dur="500" fill="hold"/>
-                                        <p:tgtEl>
-                                          <p:spTgt spid="39"/>
-                                        </p:tgtEl>
-                                        <p:attrNameLst>
-                                          <p:attrName>ppt_y</p:attrName>
-                                        </p:attrNameLst>
-                                      </p:cBhvr>
-                                      <p:tavLst>
-                                        <p:tav tm="0">
-                                          <p:val>
-                                            <p:strVal val="#ppt_y"/>
-                                          </p:val>
-                                        </p:tav>
-                                        <p:tav tm="100000">
-                                          <p:val>
-                                            <p:strVal val="#ppt_y"/>
-                                          </p:val>
-                                        </p:tav>
-                                      </p:tavLst>
-                                    </p:anim>
+                                    <p:animEffect transition="in" filter="wipe(left)">
+                                      <p:cBhvr>
+                                        <p:cTn id="29" dur="500"/>
+                                        <p:tgtEl>
+                                          <p:spTgt spid="38"/>
+                                        </p:tgtEl>
+                                      </p:cBhvr>
+                                    </p:animEffect>
                                   </p:childTnLst>
                                 </p:cTn>
                               </p:par>
                               <p:par>
-                                <p:cTn id="31" presetID="2" presetClass="entr" presetSubtype="8" fill="hold" nodeType="withEffect">
+                                <p:cTn id="30" presetID="22" presetClass="entr" presetSubtype="8" fill="hold" nodeType="withEffect">
                                   <p:stCondLst>
                                     <p:cond delay="0"/>
                                   </p:stCondLst>
                                   <p:childTnLst>
                                     <p:set>
                                       <p:cBhvr>
-                                        <p:cTn id="32" dur="1" fill="hold">
+                                        <p:cTn id="31" dur="1" fill="hold">
                                           <p:stCondLst>
                                             <p:cond delay="0"/>
                                           </p:stCondLst>
                                         </p:cTn>
                                         <p:tgtEl>
-                                          <p:spTgt spid="38"/>
+                                          <p:spTgt spid="37"/>
                                         </p:tgtEl>
                                         <p:attrNameLst>
                                           <p:attrName>style.visibility</p:attrName>
@@ -19176,183 +20330,11 @@
                                         <p:strVal val="visible"/>
                                       </p:to>
                                     </p:set>
-                                    <p:anim calcmode="lin" valueType="num">
-                                      <p:cBhvr additive="base">
-                                        <p:cTn id="33" dur="500" fill="hold"/>
-                                        <p:tgtEl>
-                                          <p:spTgt spid="38"/>
-                                        </p:tgtEl>
-                                        <p:attrNameLst>
-                                          <p:attrName>ppt_x</p:attrName>
-                                        </p:attrNameLst>
-                                      </p:cBhvr>
-                                      <p:tavLst>
-                                        <p:tav tm="0">
-                                          <p:val>
-                                            <p:strVal val="0-#ppt_w/2"/>
-                                          </p:val>
-                                        </p:tav>
-                                        <p:tav tm="100000">
-                                          <p:val>
-                                            <p:strVal val="#ppt_x"/>
-                                          </p:val>
-                                        </p:tav>
-                                      </p:tavLst>
-                                    </p:anim>
-                                    <p:anim calcmode="lin" valueType="num">
-                                      <p:cBhvr additive="base">
-                                        <p:cTn id="34" dur="500" fill="hold"/>
-                                        <p:tgtEl>
-                                          <p:spTgt spid="38"/>
-                                        </p:tgtEl>
-                                        <p:attrNameLst>
-                                          <p:attrName>ppt_y</p:attrName>
-                                        </p:attrNameLst>
-                                      </p:cBhvr>
-                                      <p:tavLst>
-                                        <p:tav tm="0">
-                                          <p:val>
-                                            <p:strVal val="#ppt_y"/>
-                                          </p:val>
-                                        </p:tav>
-                                        <p:tav tm="100000">
-                                          <p:val>
-                                            <p:strVal val="#ppt_y"/>
-                                          </p:val>
-                                        </p:tav>
-                                      </p:tavLst>
-                                    </p:anim>
-                                  </p:childTnLst>
-                                </p:cTn>
-                              </p:par>
-                              <p:par>
-                                <p:cTn id="35" presetID="2" presetClass="entr" presetSubtype="8" fill="hold" nodeType="withEffect">
-                                  <p:stCondLst>
-                                    <p:cond delay="0"/>
-                                  </p:stCondLst>
-                                  <p:childTnLst>
-                                    <p:set>
-                                      <p:cBhvr>
-                                        <p:cTn id="36" dur="1" fill="hold">
-                                          <p:stCondLst>
-                                            <p:cond delay="0"/>
-                                          </p:stCondLst>
-                                        </p:cTn>
+                                    <p:animEffect transition="in" filter="wipe(left)">
+                                      <p:cBhvr>
+                                        <p:cTn id="32" dur="500"/>
                                         <p:tgtEl>
                                           <p:spTgt spid="37"/>
-                                        </p:tgtEl>
-                                        <p:attrNameLst>
-                                          <p:attrName>style.visibility</p:attrName>
-                                        </p:attrNameLst>
-                                      </p:cBhvr>
-                                      <p:to>
-                                        <p:strVal val="visible"/>
-                                      </p:to>
-                                    </p:set>
-                                    <p:anim calcmode="lin" valueType="num">
-                                      <p:cBhvr additive="base">
-                                        <p:cTn id="37" dur="500" fill="hold"/>
-                                        <p:tgtEl>
-                                          <p:spTgt spid="37"/>
-                                        </p:tgtEl>
-                                        <p:attrNameLst>
-                                          <p:attrName>ppt_x</p:attrName>
-                                        </p:attrNameLst>
-                                      </p:cBhvr>
-                                      <p:tavLst>
-                                        <p:tav tm="0">
-                                          <p:val>
-                                            <p:strVal val="0-#ppt_w/2"/>
-                                          </p:val>
-                                        </p:tav>
-                                        <p:tav tm="100000">
-                                          <p:val>
-                                            <p:strVal val="#ppt_x"/>
-                                          </p:val>
-                                        </p:tav>
-                                      </p:tavLst>
-                                    </p:anim>
-                                    <p:anim calcmode="lin" valueType="num">
-                                      <p:cBhvr additive="base">
-                                        <p:cTn id="38" dur="500" fill="hold"/>
-                                        <p:tgtEl>
-                                          <p:spTgt spid="37"/>
-                                        </p:tgtEl>
-                                        <p:attrNameLst>
-                                          <p:attrName>ppt_y</p:attrName>
-                                        </p:attrNameLst>
-                                      </p:cBhvr>
-                                      <p:tavLst>
-                                        <p:tav tm="0">
-                                          <p:val>
-                                            <p:strVal val="#ppt_y"/>
-                                          </p:val>
-                                        </p:tav>
-                                        <p:tav tm="100000">
-                                          <p:val>
-                                            <p:strVal val="#ppt_y"/>
-                                          </p:val>
-                                        </p:tav>
-                                      </p:tavLst>
-                                    </p:anim>
-                                  </p:childTnLst>
-                                </p:cTn>
-                              </p:par>
-                            </p:childTnLst>
-                          </p:cTn>
-                        </p:par>
-                      </p:childTnLst>
-                    </p:cTn>
-                  </p:par>
-                  <p:par>
-                    <p:cTn id="39" fill="hold">
-                      <p:stCondLst>
-                        <p:cond delay="indefinite"/>
-                      </p:stCondLst>
-                      <p:childTnLst>
-                        <p:par>
-                          <p:cTn id="40" fill="hold">
-                            <p:stCondLst>
-                              <p:cond delay="0"/>
-                            </p:stCondLst>
-                            <p:childTnLst>
-                              <p:par>
-                                <p:cTn id="41" presetID="4" presetClass="entr" presetSubtype="16" fill="hold" grpId="0" nodeType="clickEffect">
-                                  <p:stCondLst>
-                                    <p:cond delay="0"/>
-                                  </p:stCondLst>
-                                  <p:childTnLst>
-                                    <p:set>
-                                      <p:cBhvr>
-                                        <p:cTn id="42" dur="1" fill="hold">
-                                          <p:stCondLst>
-                                            <p:cond delay="0"/>
-                                          </p:stCondLst>
-                                        </p:cTn>
-                                        <p:tgtEl>
-                                          <p:spTgt spid="3">
-                                            <p:txEl>
-                                              <p:pRg st="4" end="4"/>
-                                            </p:txEl>
-                                          </p:spTgt>
-                                        </p:tgtEl>
-                                        <p:attrNameLst>
-                                          <p:attrName>style.visibility</p:attrName>
-                                        </p:attrNameLst>
-                                      </p:cBhvr>
-                                      <p:to>
-                                        <p:strVal val="visible"/>
-                                      </p:to>
-                                    </p:set>
-                                    <p:animEffect transition="in" filter="box(in)">
-                                      <p:cBhvr>
-                                        <p:cTn id="43" dur="500"/>
-                                        <p:tgtEl>
-                                          <p:spTgt spid="3">
-                                            <p:txEl>
-                                              <p:pRg st="4" end="4"/>
-                                            </p:txEl>
-                                          </p:spTgt>
                                         </p:tgtEl>
                                       </p:cBhvr>
                                     </p:animEffect>
@@ -19366,32 +20348,36 @@
                     </p:cTn>
                   </p:par>
                   <p:par>
-                    <p:cTn id="44" fill="hold">
+                    <p:cTn id="33" fill="hold">
                       <p:stCondLst>
                         <p:cond delay="indefinite"/>
                       </p:stCondLst>
                       <p:childTnLst>
                         <p:par>
-                          <p:cTn id="45" fill="hold">
+                          <p:cTn id="34" fill="hold">
                             <p:stCondLst>
                               <p:cond delay="0"/>
                             </p:stCondLst>
                             <p:childTnLst>
                               <p:par>
-                                <p:cTn id="46" presetID="22" presetClass="entr" presetSubtype="8" fill="hold" nodeType="clickEffect">
+                                <p:cTn id="35" presetID="22" presetClass="entr" presetSubtype="8" fill="hold" grpId="0" nodeType="clickEffect">
                                   <p:stCondLst>
                                     <p:cond delay="0"/>
                                   </p:stCondLst>
                                   <p:childTnLst>
                                     <p:set>
                                       <p:cBhvr>
-                                        <p:cTn id="47" dur="1" fill="hold">
+                                        <p:cTn id="36" dur="1" fill="hold">
                                           <p:stCondLst>
                                             <p:cond delay="0"/>
                                           </p:stCondLst>
                                         </p:cTn>
                                         <p:tgtEl>
-                                          <p:spTgt spid="46"/>
+                                          <p:spTgt spid="3">
+                                            <p:txEl>
+                                              <p:pRg st="4" end="4"/>
+                                            </p:txEl>
+                                          </p:spTgt>
                                         </p:tgtEl>
                                         <p:attrNameLst>
                                           <p:attrName>style.visibility</p:attrName>
@@ -19403,9 +20389,13 @@
                                     </p:set>
                                     <p:animEffect transition="in" filter="wipe(left)">
                                       <p:cBhvr>
-                                        <p:cTn id="48" dur="500"/>
-                                        <p:tgtEl>
-                                          <p:spTgt spid="46"/>
+                                        <p:cTn id="37" dur="500"/>
+                                        <p:tgtEl>
+                                          <p:spTgt spid="3">
+                                            <p:txEl>
+                                              <p:pRg st="4" end="4"/>
+                                            </p:txEl>
+                                          </p:spTgt>
                                         </p:tgtEl>
                                       </p:cBhvr>
                                     </p:animEffect>
@@ -19419,32 +20409,32 @@
                     </p:cTn>
                   </p:par>
                   <p:par>
-                    <p:cTn id="49" fill="hold">
+                    <p:cTn id="38" fill="hold">
                       <p:stCondLst>
                         <p:cond delay="indefinite"/>
                       </p:stCondLst>
                       <p:childTnLst>
                         <p:par>
-                          <p:cTn id="50" fill="hold">
+                          <p:cTn id="39" fill="hold">
                             <p:stCondLst>
                               <p:cond delay="0"/>
                             </p:stCondLst>
                             <p:childTnLst>
                               <p:par>
-                                <p:cTn id="51" presetID="22" presetClass="entr" presetSubtype="8" fill="hold" grpId="0" nodeType="clickEffect">
+                                <p:cTn id="40" presetID="22" presetClass="entr" presetSubtype="8" fill="hold" nodeType="clickEffect">
                                   <p:stCondLst>
                                     <p:cond delay="0"/>
                                   </p:stCondLst>
                                   <p:childTnLst>
                                     <p:set>
                                       <p:cBhvr>
-                                        <p:cTn id="52" dur="1" fill="hold">
+                                        <p:cTn id="41" dur="1" fill="hold">
                                           <p:stCondLst>
                                             <p:cond delay="0"/>
                                           </p:stCondLst>
                                         </p:cTn>
                                         <p:tgtEl>
-                                          <p:spTgt spid="45"/>
+                                          <p:spTgt spid="46"/>
                                         </p:tgtEl>
                                         <p:attrNameLst>
                                           <p:attrName>style.visibility</p:attrName>
@@ -19456,7 +20446,60 @@
                                     </p:set>
                                     <p:animEffect transition="in" filter="wipe(left)">
                                       <p:cBhvr>
-                                        <p:cTn id="53" dur="500"/>
+                                        <p:cTn id="42" dur="500"/>
+                                        <p:tgtEl>
+                                          <p:spTgt spid="46"/>
+                                        </p:tgtEl>
+                                      </p:cBhvr>
+                                    </p:animEffect>
+                                  </p:childTnLst>
+                                </p:cTn>
+                              </p:par>
+                            </p:childTnLst>
+                          </p:cTn>
+                        </p:par>
+                      </p:childTnLst>
+                    </p:cTn>
+                  </p:par>
+                  <p:par>
+                    <p:cTn id="43" fill="hold">
+                      <p:stCondLst>
+                        <p:cond delay="indefinite"/>
+                      </p:stCondLst>
+                      <p:childTnLst>
+                        <p:par>
+                          <p:cTn id="44" fill="hold">
+                            <p:stCondLst>
+                              <p:cond delay="0"/>
+                            </p:stCondLst>
+                            <p:childTnLst>
+                              <p:par>
+                                <p:cTn id="45" presetID="22" presetClass="entr" presetSubtype="8" fill="hold" grpId="0" nodeType="clickEffect">
+                                  <p:stCondLst>
+                                    <p:cond delay="0"/>
+                                  </p:stCondLst>
+                                  <p:childTnLst>
+                                    <p:set>
+                                      <p:cBhvr>
+                                        <p:cTn id="46" dur="1" fill="hold">
+                                          <p:stCondLst>
+                                            <p:cond delay="0"/>
+                                          </p:stCondLst>
+                                        </p:cTn>
+                                        <p:tgtEl>
+                                          <p:spTgt spid="45"/>
+                                        </p:tgtEl>
+                                        <p:attrNameLst>
+                                          <p:attrName>style.visibility</p:attrName>
+                                        </p:attrNameLst>
+                                      </p:cBhvr>
+                                      <p:to>
+                                        <p:strVal val="visible"/>
+                                      </p:to>
+                                    </p:set>
+                                    <p:animEffect transition="in" filter="wipe(left)">
+                                      <p:cBhvr>
+                                        <p:cTn id="47" dur="500"/>
                                         <p:tgtEl>
                                           <p:spTgt spid="45"/>
                                         </p:tgtEl>
@@ -19493,7 +20536,7 @@
       </p:par>
     </p:tnLst>
     <p:bldLst>
-      <p:bldP spid="3" grpId="0" uiExpand="1" build="p"/>
+      <p:bldP spid="3" grpId="0" build="p"/>
       <p:bldP spid="45" grpId="0" animBg="1"/>
     </p:bldLst>
   </p:timing>
@@ -25932,7 +26975,7 @@
                             </p:stCondLst>
                             <p:childTnLst>
                               <p:par>
-                                <p:cTn id="22" presetID="4" presetClass="entr" presetSubtype="16" fill="hold" grpId="0" nodeType="clickEffect">
+                                <p:cTn id="22" presetID="22" presetClass="entr" presetSubtype="8" fill="hold" grpId="0" nodeType="clickEffect">
                                   <p:stCondLst>
                                     <p:cond delay="0"/>
                                   </p:stCondLst>
@@ -25959,7 +27002,7 @@
                                         <p:strVal val="visible"/>
                                       </p:to>
                                     </p:set>
-                                    <p:animEffect transition="in" filter="box(in)">
+                                    <p:animEffect transition="in" filter="wipe(left)">
                                       <p:cBhvr>
                                         <p:cTn id="24" dur="500"/>
                                         <p:tgtEl>
@@ -25993,7 +27036,7 @@
                             </p:stCondLst>
                             <p:childTnLst>
                               <p:par>
-                                <p:cTn id="27" presetID="4" presetClass="entr" presetSubtype="16" fill="hold" grpId="0" nodeType="clickEffect">
+                                <p:cTn id="27" presetID="22" presetClass="entr" presetSubtype="8" fill="hold" grpId="0" nodeType="clickEffect">
                                   <p:stCondLst>
                                     <p:cond delay="0"/>
                                   </p:stCondLst>
@@ -26020,7 +27063,7 @@
                                         <p:strVal val="visible"/>
                                       </p:to>
                                     </p:set>
-                                    <p:animEffect transition="in" filter="box(in)">
+                                    <p:animEffect transition="in" filter="wipe(left)">
                                       <p:cBhvr>
                                         <p:cTn id="29" dur="500"/>
                                         <p:tgtEl>
@@ -26054,7 +27097,7 @@
                             </p:stCondLst>
                             <p:childTnLst>
                               <p:par>
-                                <p:cTn id="32" presetID="4" presetClass="entr" presetSubtype="16" fill="hold" grpId="0" nodeType="clickEffect">
+                                <p:cTn id="32" presetID="22" presetClass="entr" presetSubtype="8" fill="hold" grpId="0" nodeType="clickEffect">
                                   <p:stCondLst>
                                     <p:cond delay="0"/>
                                   </p:stCondLst>
@@ -26081,7 +27124,7 @@
                                         <p:strVal val="visible"/>
                                       </p:to>
                                     </p:set>
-                                    <p:animEffect transition="in" filter="box(in)">
+                                    <p:animEffect transition="in" filter="wipe(left)">
                                       <p:cBhvr>
                                         <p:cTn id="34" dur="500"/>
                                         <p:tgtEl>
@@ -26223,7 +27266,7 @@
       </p:par>
     </p:tnLst>
     <p:bldLst>
-      <p:bldP spid="72" grpId="0" uiExpand="1" build="p"/>
+      <p:bldP spid="72" grpId="0" build="p"/>
     </p:bldLst>
   </p:timing>
 </p:sld>
@@ -26482,7 +27525,7 @@
                             </p:stCondLst>
                             <p:childTnLst>
                               <p:par>
-                                <p:cTn id="5" presetID="4" presetClass="entr" presetSubtype="16" fill="hold" grpId="0" nodeType="clickEffect">
+                                <p:cTn id="5" presetID="22" presetClass="entr" presetSubtype="8" fill="hold" grpId="0" nodeType="clickEffect">
                                   <p:stCondLst>
                                     <p:cond delay="0"/>
                                   </p:stCondLst>
@@ -26509,7 +27552,7 @@
                                         <p:strVal val="visible"/>
                                       </p:to>
                                     </p:set>
-                                    <p:animEffect transition="in" filter="box(in)">
+                                    <p:animEffect transition="in" filter="wipe(left)">
                                       <p:cBhvr>
                                         <p:cTn id="7" dur="500"/>
                                         <p:tgtEl>
@@ -26543,7 +27586,7 @@
                             </p:stCondLst>
                             <p:childTnLst>
                               <p:par>
-                                <p:cTn id="10" presetID="4" presetClass="entr" presetSubtype="16" fill="hold" grpId="0" nodeType="clickEffect">
+                                <p:cTn id="10" presetID="22" presetClass="entr" presetSubtype="8" fill="hold" grpId="0" nodeType="clickEffect">
                                   <p:stCondLst>
                                     <p:cond delay="0"/>
                                   </p:stCondLst>
@@ -26570,7 +27613,7 @@
                                         <p:strVal val="visible"/>
                                       </p:to>
                                     </p:set>
-                                    <p:animEffect transition="in" filter="box(in)">
+                                    <p:animEffect transition="in" filter="wipe(left)">
                                       <p:cBhvr>
                                         <p:cTn id="12" dur="500"/>
                                         <p:tgtEl>
@@ -27452,15 +28495,7 @@
             <a:pPr algn="ctr"/>
             <a:r>
               <a:rPr lang="en-US" dirty="0" smtClean="0"/>
-              <a:t>Tweets from a </a:t>
-            </a:r>
-            <a:r>
-              <a:rPr lang="en-US" dirty="0" smtClean="0"/>
-              <a:t>renowned social </a:t>
-            </a:r>
-            <a:r>
-              <a:rPr lang="en-US" dirty="0" smtClean="0"/>
-              <a:t>network researcher</a:t>
+              <a:t>Tweets from a renowned social network researcher</a:t>
             </a:r>
             <a:endParaRPr lang="en-US" dirty="0"/>
           </a:p>

</xml_diff>